<commit_message>
finish second pack of slide
</commit_message>
<xml_diff>
--- a/02-Android Studio.pptx
+++ b/02-Android Studio.pptx
@@ -5,20 +5,23 @@
     <p:sldMasterId id="2147483699" r:id="rId1"/>
   </p:sldMasterIdLst>
   <p:notesMasterIdLst>
-    <p:notesMasterId r:id="rId13"/>
+    <p:notesMasterId r:id="rId16"/>
   </p:notesMasterIdLst>
   <p:sldIdLst>
     <p:sldId id="257" r:id="rId2"/>
     <p:sldId id="284" r:id="rId3"/>
-    <p:sldId id="268" r:id="rId4"/>
-    <p:sldId id="289" r:id="rId5"/>
-    <p:sldId id="292" r:id="rId6"/>
-    <p:sldId id="293" r:id="rId7"/>
-    <p:sldId id="271" r:id="rId8"/>
-    <p:sldId id="272" r:id="rId9"/>
-    <p:sldId id="286" r:id="rId10"/>
-    <p:sldId id="287" r:id="rId11"/>
-    <p:sldId id="288" r:id="rId12"/>
+    <p:sldId id="289" r:id="rId4"/>
+    <p:sldId id="292" r:id="rId5"/>
+    <p:sldId id="293" r:id="rId6"/>
+    <p:sldId id="294" r:id="rId7"/>
+    <p:sldId id="272" r:id="rId8"/>
+    <p:sldId id="295" r:id="rId9"/>
+    <p:sldId id="268" r:id="rId10"/>
+    <p:sldId id="271" r:id="rId11"/>
+    <p:sldId id="286" r:id="rId12"/>
+    <p:sldId id="287" r:id="rId13"/>
+    <p:sldId id="288" r:id="rId14"/>
+    <p:sldId id="296" r:id="rId15"/>
   </p:sldIdLst>
   <p:sldSz cx="12192000" cy="6858000"/>
   <p:notesSz cx="6858000" cy="9144000"/>
@@ -207,7 +210,7 @@
           <a:p>
             <a:fld id="{A7EBB5C6-BC59-4AE5-A6E0-8DD141F892FA}" type="datetimeFigureOut">
               <a:rPr lang="en-US" smtClean="0"/>
-              <a:t>4/28/2022</a:t>
+              <a:t>4/30/2022</a:t>
             </a:fld>
             <a:endParaRPr lang="en-US"/>
           </a:p>
@@ -473,6 +476,90 @@
     </a:lvl9pPr>
   </p:notesStyle>
 </p:notesMaster>
+</file>
+
+<file path=ppt/notesSlides/notesSlide1.xml><?xml version="1.0" encoding="utf-8"?>
+<p:notes xmlns:a="http://schemas.openxmlformats.org/drawingml/2006/main" xmlns:r="http://schemas.openxmlformats.org/officeDocument/2006/relationships" xmlns:p="http://schemas.openxmlformats.org/presentationml/2006/main">
+  <p:cSld>
+    <p:spTree>
+      <p:nvGrpSpPr>
+        <p:cNvPr id="1" name=""/>
+        <p:cNvGrpSpPr/>
+        <p:nvPr/>
+      </p:nvGrpSpPr>
+      <p:grpSpPr>
+        <a:xfrm>
+          <a:off x="0" y="0"/>
+          <a:ext cx="0" cy="0"/>
+          <a:chOff x="0" y="0"/>
+          <a:chExt cx="0" cy="0"/>
+        </a:xfrm>
+      </p:grpSpPr>
+      <p:sp>
+        <p:nvSpPr>
+          <p:cNvPr id="2" name="Segnaposto immagine diapositiva 1"/>
+          <p:cNvSpPr>
+            <a:spLocks noGrp="1" noRot="1" noChangeAspect="1"/>
+          </p:cNvSpPr>
+          <p:nvPr>
+            <p:ph type="sldImg"/>
+          </p:nvPr>
+        </p:nvSpPr>
+        <p:spPr/>
+      </p:sp>
+      <p:sp>
+        <p:nvSpPr>
+          <p:cNvPr id="3" name="Segnaposto note 2"/>
+          <p:cNvSpPr>
+            <a:spLocks noGrp="1"/>
+          </p:cNvSpPr>
+          <p:nvPr>
+            <p:ph type="body" idx="1"/>
+          </p:nvPr>
+        </p:nvSpPr>
+        <p:spPr/>
+        <p:txBody>
+          <a:bodyPr/>
+          <a:lstStyle/>
+          <a:p>
+            <a:endParaRPr lang="en-US" dirty="0"/>
+          </a:p>
+        </p:txBody>
+      </p:sp>
+      <p:sp>
+        <p:nvSpPr>
+          <p:cNvPr id="4" name="Segnaposto numero diapositiva 3"/>
+          <p:cNvSpPr>
+            <a:spLocks noGrp="1"/>
+          </p:cNvSpPr>
+          <p:nvPr>
+            <p:ph type="sldNum" sz="quarter" idx="5"/>
+          </p:nvPr>
+        </p:nvSpPr>
+        <p:spPr/>
+        <p:txBody>
+          <a:bodyPr/>
+          <a:lstStyle/>
+          <a:p>
+            <a:fld id="{27E8C9FB-7FA1-4DCC-8035-36B8BC0E5FFB}" type="slidenum">
+              <a:rPr lang="en-US" smtClean="0"/>
+              <a:t>5</a:t>
+            </a:fld>
+            <a:endParaRPr lang="en-US"/>
+          </a:p>
+        </p:txBody>
+      </p:sp>
+    </p:spTree>
+    <p:extLst>
+      <p:ext uri="{BB962C8B-B14F-4D97-AF65-F5344CB8AC3E}">
+        <p14:creationId xmlns:p14="http://schemas.microsoft.com/office/powerpoint/2010/main" val="3312600936"/>
+      </p:ext>
+    </p:extLst>
+  </p:cSld>
+  <p:clrMapOvr>
+    <a:masterClrMapping/>
+  </p:clrMapOvr>
+</p:notes>
 </file>
 
 <file path=ppt/slideLayouts/slideLayout1.xml><?xml version="1.0" encoding="utf-8"?>
@@ -3749,10 +3836,10 @@
       </p:grpSpPr>
       <p:sp>
         <p:nvSpPr>
-          <p:cNvPr id="2" name="Titolo 1">
+          <p:cNvPr id="10" name="Title 1">
             <a:extLst>
               <a:ext uri="{FF2B5EF4-FFF2-40B4-BE49-F238E27FC236}">
-                <a16:creationId xmlns:a16="http://schemas.microsoft.com/office/drawing/2014/main" id="{2A8FC0F3-E356-42D4-A7E7-74C04CFE993F}"/>
+                <a16:creationId xmlns:a16="http://schemas.microsoft.com/office/drawing/2014/main" id="{E680C420-AA48-599F-6F71-800A30737121}"/>
               </a:ext>
             </a:extLst>
           </p:cNvPr>
@@ -3763,24 +3850,29 @@
             <p:ph type="title"/>
           </p:nvPr>
         </p:nvSpPr>
-        <p:spPr/>
+        <p:spPr>
+          <a:xfrm>
+            <a:off x="609600" y="274638"/>
+            <a:ext cx="10972800" cy="1143000"/>
+          </a:xfrm>
+        </p:spPr>
         <p:txBody>
           <a:bodyPr/>
           <a:lstStyle/>
           <a:p>
             <a:r>
               <a:rPr lang="en-US" dirty="0"/>
-              <a:t>Create an Emulator</a:t>
-            </a:r>
-          </a:p>
-        </p:txBody>
-      </p:sp>
-      <p:sp>
-        <p:nvSpPr>
-          <p:cNvPr id="3" name="Segnaposto contenuto 2">
+              <a:t>Important note</a:t>
+            </a:r>
+          </a:p>
+        </p:txBody>
+      </p:sp>
+      <p:sp>
+        <p:nvSpPr>
+          <p:cNvPr id="3" name="Content Placeholder 2">
             <a:extLst>
               <a:ext uri="{FF2B5EF4-FFF2-40B4-BE49-F238E27FC236}">
-                <a16:creationId xmlns:a16="http://schemas.microsoft.com/office/drawing/2014/main" id="{2170B03E-BCD6-441D-99D0-DE1EB7D60DB2}"/>
+                <a16:creationId xmlns:a16="http://schemas.microsoft.com/office/drawing/2014/main" id="{467EC6DC-A0E3-44E1-AD38-B2D81306469B}"/>
               </a:ext>
             </a:extLst>
           </p:cNvPr>
@@ -3788,121 +3880,98 @@
             <a:spLocks noGrp="1"/>
           </p:cNvSpPr>
           <p:nvPr>
-            <p:ph idx="1"/>
+            <p:ph sz="half" idx="1"/>
           </p:nvPr>
         </p:nvSpPr>
-        <p:spPr/>
-        <p:txBody>
-          <a:bodyPr/>
+        <p:spPr>
+          <a:xfrm>
+            <a:off x="609600" y="1600201"/>
+            <a:ext cx="11582400" cy="4525963"/>
+          </a:xfrm>
+        </p:spPr>
+        <p:txBody>
+          <a:bodyPr>
+            <a:normAutofit/>
+          </a:bodyPr>
           <a:lstStyle/>
           <a:p>
-            <a:pPr marL="514350" indent="-514350">
-              <a:buFont typeface="+mj-lt"/>
-              <a:buAutoNum type="arabicPeriod" startAt="3"/>
+            <a:pPr marL="0" indent="0">
+              <a:buNone/>
             </a:pPr>
             <a:r>
-              <a:rPr lang="en-US" sz="2000" dirty="0"/>
-              <a:t>Choose the device that fits for your project</a:t>
-            </a:r>
-          </a:p>
-          <a:p>
-            <a:pPr marL="514350" indent="-514350">
-              <a:buFont typeface="+mj-lt"/>
-              <a:buAutoNum type="arabicPeriod" startAt="3"/>
+              <a:rPr lang="en-US" sz="2300" b="1" dirty="0"/>
+              <a:t>Select SDK</a:t>
+            </a:r>
+            <a:r>
+              <a:rPr lang="en-US" sz="2300" dirty="0"/>
+              <a:t>: It’s important for app’s compatibility according android version on mobile device. You can use API 21:android 5.0. If you want use different SDK, click on ‘Help me to choose’</a:t>
+            </a:r>
+          </a:p>
+          <a:p>
+            <a:pPr marL="0" indent="0">
+              <a:buNone/>
             </a:pPr>
             <a:r>
-              <a:rPr lang="en-US" sz="2000" dirty="0"/>
-              <a:t>In base of which device you choose you have to select the version of android that you want on it</a:t>
-            </a:r>
-          </a:p>
-          <a:p>
-            <a:pPr marL="514350" indent="-514350">
-              <a:buFont typeface="+mj-lt"/>
-              <a:buAutoNum type="arabicPeriod" startAt="3"/>
+              <a:rPr lang="en-US" sz="2300" dirty="0"/>
+              <a:t>If you don’t have any SDK installed, you can click ‘finish’ and  on IDE click: </a:t>
+            </a:r>
+          </a:p>
+          <a:p>
+            <a:pPr marL="0" indent="0">
+              <a:buNone/>
             </a:pPr>
-            <a:endParaRPr lang="en-US" sz="2800" dirty="0"/>
-          </a:p>
-          <a:p>
-            <a:pPr marL="514350" indent="-514350">
-              <a:buFont typeface="+mj-lt"/>
-              <a:buAutoNum type="arabicPeriod" startAt="3"/>
+            <a:r>
+              <a:rPr lang="en-US" sz="2200" b="1" dirty="0"/>
+              <a:t>File-&gt;Settings-&gt;Appearance &amp; Behavior-&gt;System Settings-&gt;Android SDK -&gt;click one SDK-&gt;apply</a:t>
+            </a:r>
+            <a:r>
+              <a:rPr lang="en-US" sz="2200" dirty="0"/>
+              <a:t>. </a:t>
+            </a:r>
+          </a:p>
+          <a:p>
+            <a:pPr marL="0" indent="0">
+              <a:buNone/>
             </a:pPr>
-            <a:endParaRPr lang="en-US" dirty="0"/>
-          </a:p>
-          <a:p>
-            <a:pPr marL="514350" indent="-514350">
-              <a:buFont typeface="+mj-lt"/>
-              <a:buAutoNum type="arabicPeriod" startAt="3"/>
+            <a:r>
+              <a:rPr lang="en-US" sz="2300" dirty="0"/>
+              <a:t>Automatically android studio will install it for you.</a:t>
+            </a:r>
+          </a:p>
+          <a:p>
+            <a:pPr marL="0" indent="0">
+              <a:buNone/>
             </a:pPr>
-            <a:endParaRPr lang="en-US" dirty="0"/>
-          </a:p>
-        </p:txBody>
-      </p:sp>
-      <p:pic>
-        <p:nvPicPr>
-          <p:cNvPr id="4" name="Content Placeholder 5">
-            <a:extLst>
-              <a:ext uri="{FF2B5EF4-FFF2-40B4-BE49-F238E27FC236}">
-                <a16:creationId xmlns:a16="http://schemas.microsoft.com/office/drawing/2014/main" id="{45BC52ED-EAE1-47FE-944A-3C0A247CD67F}"/>
-              </a:ext>
-            </a:extLst>
-          </p:cNvPr>
-          <p:cNvPicPr>
-            <a:picLocks noChangeAspect="1"/>
-          </p:cNvPicPr>
-          <p:nvPr/>
-        </p:nvPicPr>
-        <p:blipFill>
-          <a:blip r:embed="rId2"/>
-          <a:stretch>
-            <a:fillRect/>
-          </a:stretch>
-        </p:blipFill>
-        <p:spPr>
-          <a:xfrm>
-            <a:off x="711200" y="2512444"/>
-            <a:ext cx="5384800" cy="3796283"/>
-          </a:xfrm>
-          <a:prstGeom prst="rect">
-            <a:avLst/>
-          </a:prstGeom>
-          <a:noFill/>
-        </p:spPr>
-      </p:pic>
-      <p:pic>
-        <p:nvPicPr>
-          <p:cNvPr id="6" name="Immagine 5">
-            <a:extLst>
-              <a:ext uri="{FF2B5EF4-FFF2-40B4-BE49-F238E27FC236}">
-                <a16:creationId xmlns:a16="http://schemas.microsoft.com/office/drawing/2014/main" id="{D8CE5507-D53F-4221-9BE9-A4E278A4347E}"/>
-              </a:ext>
-            </a:extLst>
-          </p:cNvPr>
-          <p:cNvPicPr>
-            <a:picLocks noChangeAspect="1"/>
-          </p:cNvPicPr>
-          <p:nvPr/>
-        </p:nvPicPr>
-        <p:blipFill>
-          <a:blip r:embed="rId3"/>
-          <a:stretch>
-            <a:fillRect/>
-          </a:stretch>
-        </p:blipFill>
-        <p:spPr>
-          <a:xfrm>
-            <a:off x="6227870" y="2512444"/>
-            <a:ext cx="5456130" cy="3796283"/>
-          </a:xfrm>
-          <a:prstGeom prst="rect">
-            <a:avLst/>
-          </a:prstGeom>
-        </p:spPr>
-      </p:pic>
+            <a:endParaRPr lang="en-US" sz="2300" dirty="0"/>
+          </a:p>
+          <a:p>
+            <a:pPr marL="0" indent="0">
+              <a:buNone/>
+            </a:pPr>
+            <a:r>
+              <a:rPr lang="en-US" sz="2300" b="1" dirty="0"/>
+              <a:t>Note</a:t>
+            </a:r>
+            <a:r>
+              <a:rPr lang="en-US" sz="2300" dirty="0"/>
+              <a:t>: if you need in future to indicate SDK’s path, you can always find it on: </a:t>
+            </a:r>
+          </a:p>
+          <a:p>
+            <a:pPr marL="0" indent="0">
+              <a:buNone/>
+            </a:pPr>
+            <a:r>
+              <a:rPr lang="en-US" sz="2300" b="1" dirty="0"/>
+              <a:t>File-&gt;Settings-&gt;Appearance &amp; Behavior-&gt;System Settings-&gt;Android SDK</a:t>
+            </a:r>
+          </a:p>
+        </p:txBody>
+      </p:sp>
     </p:spTree>
     <p:extLst>
       <p:ext uri="{BB962C8B-B14F-4D97-AF65-F5344CB8AC3E}">
-        <p14:creationId xmlns:p14="http://schemas.microsoft.com/office/powerpoint/2010/main" val="3614758432"/>
+        <p14:creationId xmlns:p14="http://schemas.microsoft.com/office/powerpoint/2010/main" val="530826719"/>
       </p:ext>
     </p:extLst>
   </p:cSld>
@@ -3934,6 +4003,470 @@
           <p:cNvPr id="2" name="Titolo 1">
             <a:extLst>
               <a:ext uri="{FF2B5EF4-FFF2-40B4-BE49-F238E27FC236}">
+                <a16:creationId xmlns:a16="http://schemas.microsoft.com/office/drawing/2014/main" id="{8DC1659F-7805-4EE3-ACCF-664C71D03C63}"/>
+              </a:ext>
+            </a:extLst>
+          </p:cNvPr>
+          <p:cNvSpPr>
+            <a:spLocks noGrp="1"/>
+          </p:cNvSpPr>
+          <p:nvPr>
+            <p:ph type="title"/>
+          </p:nvPr>
+        </p:nvSpPr>
+        <p:spPr>
+          <a:xfrm>
+            <a:off x="609600" y="274638"/>
+            <a:ext cx="10972800" cy="1143000"/>
+          </a:xfrm>
+        </p:spPr>
+        <p:txBody>
+          <a:bodyPr anchor="ctr">
+            <a:normAutofit/>
+          </a:bodyPr>
+          <a:lstStyle/>
+          <a:p>
+            <a:r>
+              <a:rPr lang="en-US" dirty="0"/>
+              <a:t>Create an Emulator</a:t>
+            </a:r>
+          </a:p>
+        </p:txBody>
+      </p:sp>
+      <p:pic>
+        <p:nvPicPr>
+          <p:cNvPr id="15" name="Segnaposto contenuto 8" descr="Immagine che contiene testo&#10;&#10;Descrizione generata automaticamente">
+            <a:extLst>
+              <a:ext uri="{FF2B5EF4-FFF2-40B4-BE49-F238E27FC236}">
+                <a16:creationId xmlns:a16="http://schemas.microsoft.com/office/drawing/2014/main" id="{D0D6A946-60C8-4CD5-B79F-A99C5A39242D}"/>
+              </a:ext>
+            </a:extLst>
+          </p:cNvPr>
+          <p:cNvPicPr>
+            <a:picLocks noChangeAspect="1"/>
+          </p:cNvPicPr>
+          <p:nvPr/>
+        </p:nvPicPr>
+        <p:blipFill>
+          <a:blip r:embed="rId2"/>
+          <a:stretch>
+            <a:fillRect/>
+          </a:stretch>
+        </p:blipFill>
+        <p:spPr>
+          <a:xfrm>
+            <a:off x="1616770" y="2338425"/>
+            <a:ext cx="3731621" cy="4355646"/>
+          </a:xfrm>
+          <a:prstGeom prst="rect">
+            <a:avLst/>
+          </a:prstGeom>
+          <a:noFill/>
+        </p:spPr>
+      </p:pic>
+      <p:sp>
+        <p:nvSpPr>
+          <p:cNvPr id="16" name="Rettangolo 15">
+            <a:extLst>
+              <a:ext uri="{FF2B5EF4-FFF2-40B4-BE49-F238E27FC236}">
+                <a16:creationId xmlns:a16="http://schemas.microsoft.com/office/drawing/2014/main" id="{26E9EB15-6994-4AFC-BC6C-13F74036DA3B}"/>
+              </a:ext>
+            </a:extLst>
+          </p:cNvPr>
+          <p:cNvSpPr/>
+          <p:nvPr/>
+        </p:nvSpPr>
+        <p:spPr>
+          <a:xfrm>
+            <a:off x="5191125" y="3169422"/>
+            <a:ext cx="157266" cy="659629"/>
+          </a:xfrm>
+          <a:prstGeom prst="rect">
+            <a:avLst/>
+          </a:prstGeom>
+          <a:noFill/>
+          <a:ln w="28575">
+            <a:solidFill>
+              <a:srgbClr val="FF0000"/>
+            </a:solidFill>
+          </a:ln>
+        </p:spPr>
+        <p:style>
+          <a:lnRef idx="1">
+            <a:schemeClr val="accent1"/>
+          </a:lnRef>
+          <a:fillRef idx="3">
+            <a:schemeClr val="accent1"/>
+          </a:fillRef>
+          <a:effectRef idx="2">
+            <a:schemeClr val="accent1"/>
+          </a:effectRef>
+          <a:fontRef idx="minor">
+            <a:schemeClr val="lt1"/>
+          </a:fontRef>
+        </p:style>
+        <p:txBody>
+          <a:bodyPr rtlCol="0" anchor="ctr"/>
+          <a:lstStyle/>
+          <a:p>
+            <a:pPr algn="ctr"/>
+            <a:endParaRPr lang="en-US" dirty="0">
+              <a:solidFill>
+                <a:srgbClr val="FF0000"/>
+              </a:solidFill>
+            </a:endParaRPr>
+          </a:p>
+        </p:txBody>
+      </p:sp>
+      <p:pic>
+        <p:nvPicPr>
+          <p:cNvPr id="4" name="Immagine 3">
+            <a:extLst>
+              <a:ext uri="{FF2B5EF4-FFF2-40B4-BE49-F238E27FC236}">
+                <a16:creationId xmlns:a16="http://schemas.microsoft.com/office/drawing/2014/main" id="{6CBB09AB-C53B-4969-94C0-EE73184999A2}"/>
+              </a:ext>
+            </a:extLst>
+          </p:cNvPr>
+          <p:cNvPicPr>
+            <a:picLocks noChangeAspect="1"/>
+          </p:cNvPicPr>
+          <p:nvPr/>
+        </p:nvPicPr>
+        <p:blipFill rotWithShape="1">
+          <a:blip r:embed="rId3"/>
+          <a:srcRect b="29924"/>
+          <a:stretch/>
+        </p:blipFill>
+        <p:spPr>
+          <a:xfrm>
+            <a:off x="5942105" y="2336800"/>
+            <a:ext cx="5910383" cy="4357271"/>
+          </a:xfrm>
+          <a:prstGeom prst="rect">
+            <a:avLst/>
+          </a:prstGeom>
+        </p:spPr>
+      </p:pic>
+      <p:sp>
+        <p:nvSpPr>
+          <p:cNvPr id="8" name="Rettangolo 7">
+            <a:extLst>
+              <a:ext uri="{FF2B5EF4-FFF2-40B4-BE49-F238E27FC236}">
+                <a16:creationId xmlns:a16="http://schemas.microsoft.com/office/drawing/2014/main" id="{216FE7A6-3D9D-4730-8B9F-FC410C890274}"/>
+              </a:ext>
+            </a:extLst>
+          </p:cNvPr>
+          <p:cNvSpPr/>
+          <p:nvPr/>
+        </p:nvSpPr>
+        <p:spPr>
+          <a:xfrm>
+            <a:off x="5989555" y="3038475"/>
+            <a:ext cx="1383702" cy="390525"/>
+          </a:xfrm>
+          <a:prstGeom prst="rect">
+            <a:avLst/>
+          </a:prstGeom>
+          <a:noFill/>
+          <a:ln w="28575">
+            <a:solidFill>
+              <a:srgbClr val="FF0000"/>
+            </a:solidFill>
+          </a:ln>
+        </p:spPr>
+        <p:style>
+          <a:lnRef idx="1">
+            <a:schemeClr val="accent1"/>
+          </a:lnRef>
+          <a:fillRef idx="3">
+            <a:schemeClr val="accent1"/>
+          </a:fillRef>
+          <a:effectRef idx="2">
+            <a:schemeClr val="accent1"/>
+          </a:effectRef>
+          <a:fontRef idx="minor">
+            <a:schemeClr val="lt1"/>
+          </a:fontRef>
+        </p:style>
+        <p:txBody>
+          <a:bodyPr rtlCol="0" anchor="ctr"/>
+          <a:lstStyle/>
+          <a:p>
+            <a:pPr algn="ctr"/>
+            <a:endParaRPr lang="en-US" dirty="0">
+              <a:solidFill>
+                <a:srgbClr val="FF0000"/>
+              </a:solidFill>
+            </a:endParaRPr>
+          </a:p>
+        </p:txBody>
+      </p:sp>
+      <p:sp>
+        <p:nvSpPr>
+          <p:cNvPr id="10" name="CasellaDiTesto 9">
+            <a:extLst>
+              <a:ext uri="{FF2B5EF4-FFF2-40B4-BE49-F238E27FC236}">
+                <a16:creationId xmlns:a16="http://schemas.microsoft.com/office/drawing/2014/main" id="{60DB8F11-E5DD-4334-9073-67679C657768}"/>
+              </a:ext>
+            </a:extLst>
+          </p:cNvPr>
+          <p:cNvSpPr txBox="1"/>
+          <p:nvPr/>
+        </p:nvSpPr>
+        <p:spPr>
+          <a:xfrm>
+            <a:off x="975606" y="1507807"/>
+            <a:ext cx="10876882" cy="830997"/>
+          </a:xfrm>
+          <a:prstGeom prst="rect">
+            <a:avLst/>
+          </a:prstGeom>
+          <a:noFill/>
+        </p:spPr>
+        <p:txBody>
+          <a:bodyPr wrap="square">
+            <a:spAutoFit/>
+          </a:bodyPr>
+          <a:lstStyle/>
+          <a:p>
+            <a:pPr marL="457200" indent="-457200">
+              <a:buFont typeface="+mj-lt"/>
+              <a:buAutoNum type="arabicPeriod"/>
+            </a:pPr>
+            <a:r>
+              <a:rPr lang="en-US" sz="2400" dirty="0"/>
+              <a:t>Select Device Manager</a:t>
+            </a:r>
+          </a:p>
+          <a:p>
+            <a:pPr marL="457200" indent="-457200">
+              <a:buFont typeface="+mj-lt"/>
+              <a:buAutoNum type="arabicPeriod"/>
+            </a:pPr>
+            <a:r>
+              <a:rPr lang="en-US" sz="2400" dirty="0"/>
+              <a:t>Click create Device</a:t>
+            </a:r>
+          </a:p>
+        </p:txBody>
+      </p:sp>
+    </p:spTree>
+    <p:extLst>
+      <p:ext uri="{BB962C8B-B14F-4D97-AF65-F5344CB8AC3E}">
+        <p14:creationId xmlns:p14="http://schemas.microsoft.com/office/powerpoint/2010/main" val="3404653906"/>
+      </p:ext>
+    </p:extLst>
+  </p:cSld>
+  <p:clrMapOvr>
+    <a:masterClrMapping/>
+  </p:clrMapOvr>
+</p:sld>
+</file>
+
+<file path=ppt/slides/slide12.xml><?xml version="1.0" encoding="utf-8"?>
+<p:sld xmlns:a="http://schemas.openxmlformats.org/drawingml/2006/main" xmlns:r="http://schemas.openxmlformats.org/officeDocument/2006/relationships" xmlns:p="http://schemas.openxmlformats.org/presentationml/2006/main">
+  <p:cSld>
+    <p:spTree>
+      <p:nvGrpSpPr>
+        <p:cNvPr id="1" name=""/>
+        <p:cNvGrpSpPr/>
+        <p:nvPr/>
+      </p:nvGrpSpPr>
+      <p:grpSpPr>
+        <a:xfrm>
+          <a:off x="0" y="0"/>
+          <a:ext cx="0" cy="0"/>
+          <a:chOff x="0" y="0"/>
+          <a:chExt cx="0" cy="0"/>
+        </a:xfrm>
+      </p:grpSpPr>
+      <p:sp>
+        <p:nvSpPr>
+          <p:cNvPr id="2" name="Titolo 1">
+            <a:extLst>
+              <a:ext uri="{FF2B5EF4-FFF2-40B4-BE49-F238E27FC236}">
+                <a16:creationId xmlns:a16="http://schemas.microsoft.com/office/drawing/2014/main" id="{2A8FC0F3-E356-42D4-A7E7-74C04CFE993F}"/>
+              </a:ext>
+            </a:extLst>
+          </p:cNvPr>
+          <p:cNvSpPr>
+            <a:spLocks noGrp="1"/>
+          </p:cNvSpPr>
+          <p:nvPr>
+            <p:ph type="title"/>
+          </p:nvPr>
+        </p:nvSpPr>
+        <p:spPr/>
+        <p:txBody>
+          <a:bodyPr/>
+          <a:lstStyle/>
+          <a:p>
+            <a:r>
+              <a:rPr lang="en-US" dirty="0"/>
+              <a:t>Create an Emulator</a:t>
+            </a:r>
+          </a:p>
+        </p:txBody>
+      </p:sp>
+      <p:sp>
+        <p:nvSpPr>
+          <p:cNvPr id="3" name="Segnaposto contenuto 2">
+            <a:extLst>
+              <a:ext uri="{FF2B5EF4-FFF2-40B4-BE49-F238E27FC236}">
+                <a16:creationId xmlns:a16="http://schemas.microsoft.com/office/drawing/2014/main" id="{2170B03E-BCD6-441D-99D0-DE1EB7D60DB2}"/>
+              </a:ext>
+            </a:extLst>
+          </p:cNvPr>
+          <p:cNvSpPr>
+            <a:spLocks noGrp="1"/>
+          </p:cNvSpPr>
+          <p:nvPr>
+            <p:ph idx="1"/>
+          </p:nvPr>
+        </p:nvSpPr>
+        <p:spPr/>
+        <p:txBody>
+          <a:bodyPr/>
+          <a:lstStyle/>
+          <a:p>
+            <a:pPr marL="514350" indent="-514350">
+              <a:buFont typeface="+mj-lt"/>
+              <a:buAutoNum type="arabicPeriod" startAt="3"/>
+            </a:pPr>
+            <a:r>
+              <a:rPr lang="en-US" sz="2000" dirty="0"/>
+              <a:t>Choose the device that fits for your project</a:t>
+            </a:r>
+          </a:p>
+          <a:p>
+            <a:pPr marL="514350" indent="-514350">
+              <a:buFont typeface="+mj-lt"/>
+              <a:buAutoNum type="arabicPeriod" startAt="3"/>
+            </a:pPr>
+            <a:r>
+              <a:rPr lang="en-US" sz="2000" dirty="0"/>
+              <a:t>In base of which device you choose you have to select the version of android that you want on it</a:t>
+            </a:r>
+          </a:p>
+          <a:p>
+            <a:pPr marL="514350" indent="-514350">
+              <a:buFont typeface="+mj-lt"/>
+              <a:buAutoNum type="arabicPeriod" startAt="3"/>
+            </a:pPr>
+            <a:endParaRPr lang="en-US" sz="2800" dirty="0"/>
+          </a:p>
+          <a:p>
+            <a:pPr marL="514350" indent="-514350">
+              <a:buFont typeface="+mj-lt"/>
+              <a:buAutoNum type="arabicPeriod" startAt="3"/>
+            </a:pPr>
+            <a:endParaRPr lang="en-US" dirty="0"/>
+          </a:p>
+          <a:p>
+            <a:pPr marL="514350" indent="-514350">
+              <a:buFont typeface="+mj-lt"/>
+              <a:buAutoNum type="arabicPeriod" startAt="3"/>
+            </a:pPr>
+            <a:endParaRPr lang="en-US" dirty="0"/>
+          </a:p>
+        </p:txBody>
+      </p:sp>
+      <p:pic>
+        <p:nvPicPr>
+          <p:cNvPr id="4" name="Content Placeholder 5">
+            <a:extLst>
+              <a:ext uri="{FF2B5EF4-FFF2-40B4-BE49-F238E27FC236}">
+                <a16:creationId xmlns:a16="http://schemas.microsoft.com/office/drawing/2014/main" id="{45BC52ED-EAE1-47FE-944A-3C0A247CD67F}"/>
+              </a:ext>
+            </a:extLst>
+          </p:cNvPr>
+          <p:cNvPicPr>
+            <a:picLocks noChangeAspect="1"/>
+          </p:cNvPicPr>
+          <p:nvPr/>
+        </p:nvPicPr>
+        <p:blipFill>
+          <a:blip r:embed="rId2"/>
+          <a:stretch>
+            <a:fillRect/>
+          </a:stretch>
+        </p:blipFill>
+        <p:spPr>
+          <a:xfrm>
+            <a:off x="711200" y="2512444"/>
+            <a:ext cx="5384800" cy="3796283"/>
+          </a:xfrm>
+          <a:prstGeom prst="rect">
+            <a:avLst/>
+          </a:prstGeom>
+          <a:noFill/>
+        </p:spPr>
+      </p:pic>
+      <p:pic>
+        <p:nvPicPr>
+          <p:cNvPr id="6" name="Immagine 5">
+            <a:extLst>
+              <a:ext uri="{FF2B5EF4-FFF2-40B4-BE49-F238E27FC236}">
+                <a16:creationId xmlns:a16="http://schemas.microsoft.com/office/drawing/2014/main" id="{D8CE5507-D53F-4221-9BE9-A4E278A4347E}"/>
+              </a:ext>
+            </a:extLst>
+          </p:cNvPr>
+          <p:cNvPicPr>
+            <a:picLocks noChangeAspect="1"/>
+          </p:cNvPicPr>
+          <p:nvPr/>
+        </p:nvPicPr>
+        <p:blipFill>
+          <a:blip r:embed="rId3"/>
+          <a:stretch>
+            <a:fillRect/>
+          </a:stretch>
+        </p:blipFill>
+        <p:spPr>
+          <a:xfrm>
+            <a:off x="6227870" y="2512444"/>
+            <a:ext cx="5456130" cy="3796283"/>
+          </a:xfrm>
+          <a:prstGeom prst="rect">
+            <a:avLst/>
+          </a:prstGeom>
+        </p:spPr>
+      </p:pic>
+    </p:spTree>
+    <p:extLst>
+      <p:ext uri="{BB962C8B-B14F-4D97-AF65-F5344CB8AC3E}">
+        <p14:creationId xmlns:p14="http://schemas.microsoft.com/office/powerpoint/2010/main" val="3614758432"/>
+      </p:ext>
+    </p:extLst>
+  </p:cSld>
+  <p:clrMapOvr>
+    <a:masterClrMapping/>
+  </p:clrMapOvr>
+</p:sld>
+</file>
+
+<file path=ppt/slides/slide13.xml><?xml version="1.0" encoding="utf-8"?>
+<p:sld xmlns:a="http://schemas.openxmlformats.org/drawingml/2006/main" xmlns:r="http://schemas.openxmlformats.org/officeDocument/2006/relationships" xmlns:p="http://schemas.openxmlformats.org/presentationml/2006/main">
+  <p:cSld>
+    <p:spTree>
+      <p:nvGrpSpPr>
+        <p:cNvPr id="1" name=""/>
+        <p:cNvGrpSpPr/>
+        <p:nvPr/>
+      </p:nvGrpSpPr>
+      <p:grpSpPr>
+        <a:xfrm>
+          <a:off x="0" y="0"/>
+          <a:ext cx="0" cy="0"/>
+          <a:chOff x="0" y="0"/>
+          <a:chExt cx="0" cy="0"/>
+        </a:xfrm>
+      </p:grpSpPr>
+      <p:sp>
+        <p:nvSpPr>
+          <p:cNvPr id="2" name="Titolo 1">
+            <a:extLst>
+              <a:ext uri="{FF2B5EF4-FFF2-40B4-BE49-F238E27FC236}">
                 <a16:creationId xmlns:a16="http://schemas.microsoft.com/office/drawing/2014/main" id="{CD0C2982-11F3-48C7-9E92-49C3F99EB1DB}"/>
               </a:ext>
             </a:extLst>
@@ -4197,6 +4730,147 @@
     <p:extLst>
       <p:ext uri="{BB962C8B-B14F-4D97-AF65-F5344CB8AC3E}">
         <p14:creationId xmlns:p14="http://schemas.microsoft.com/office/powerpoint/2010/main" val="808160936"/>
+      </p:ext>
+    </p:extLst>
+  </p:cSld>
+  <p:clrMapOvr>
+    <a:masterClrMapping/>
+  </p:clrMapOvr>
+</p:sld>
+</file>
+
+<file path=ppt/slides/slide14.xml><?xml version="1.0" encoding="utf-8"?>
+<p:sld xmlns:a="http://schemas.openxmlformats.org/drawingml/2006/main" xmlns:r="http://schemas.openxmlformats.org/officeDocument/2006/relationships" xmlns:p="http://schemas.openxmlformats.org/presentationml/2006/main">
+  <p:cSld>
+    <p:spTree>
+      <p:nvGrpSpPr>
+        <p:cNvPr id="1" name=""/>
+        <p:cNvGrpSpPr/>
+        <p:nvPr/>
+      </p:nvGrpSpPr>
+      <p:grpSpPr>
+        <a:xfrm>
+          <a:off x="0" y="0"/>
+          <a:ext cx="0" cy="0"/>
+          <a:chOff x="0" y="0"/>
+          <a:chExt cx="0" cy="0"/>
+        </a:xfrm>
+      </p:grpSpPr>
+      <p:sp>
+        <p:nvSpPr>
+          <p:cNvPr id="2" name="Titolo 1">
+            <a:extLst>
+              <a:ext uri="{FF2B5EF4-FFF2-40B4-BE49-F238E27FC236}">
+                <a16:creationId xmlns:a16="http://schemas.microsoft.com/office/drawing/2014/main" id="{E7F003EB-3402-48AE-4380-04AC8E62C207}"/>
+              </a:ext>
+            </a:extLst>
+          </p:cNvPr>
+          <p:cNvSpPr>
+            <a:spLocks noGrp="1"/>
+          </p:cNvSpPr>
+          <p:nvPr>
+            <p:ph type="title"/>
+          </p:nvPr>
+        </p:nvSpPr>
+        <p:spPr/>
+        <p:txBody>
+          <a:bodyPr/>
+          <a:lstStyle/>
+          <a:p>
+            <a:r>
+              <a:rPr lang="en-US" dirty="0"/>
+              <a:t>Android Profiler</a:t>
+            </a:r>
+          </a:p>
+        </p:txBody>
+      </p:sp>
+      <p:sp>
+        <p:nvSpPr>
+          <p:cNvPr id="3" name="Segnaposto contenuto 2">
+            <a:extLst>
+              <a:ext uri="{FF2B5EF4-FFF2-40B4-BE49-F238E27FC236}">
+                <a16:creationId xmlns:a16="http://schemas.microsoft.com/office/drawing/2014/main" id="{E95AF1FB-7F53-31DC-6AD1-72C455FC760D}"/>
+              </a:ext>
+            </a:extLst>
+          </p:cNvPr>
+          <p:cNvSpPr>
+            <a:spLocks noGrp="1"/>
+          </p:cNvSpPr>
+          <p:nvPr>
+            <p:ph idx="1"/>
+          </p:nvPr>
+        </p:nvSpPr>
+        <p:spPr/>
+        <p:txBody>
+          <a:bodyPr>
+            <a:normAutofit/>
+          </a:bodyPr>
+          <a:lstStyle/>
+          <a:p>
+            <a:pPr marL="0" indent="0">
+              <a:buNone/>
+            </a:pPr>
+            <a:r>
+              <a:rPr lang="en-US" sz="2400" b="0" i="0" dirty="0">
+                <a:solidFill>
+                  <a:srgbClr val="202124"/>
+                </a:solidFill>
+                <a:effectLst/>
+                <a:latin typeface="+mj-lt"/>
+              </a:rPr>
+              <a:t>The Android Profiler in Android Studio 3.0 and higher replaces the Android Monitor tools. The Android Profiler tools provide real-time data to help you to understand how your app uses CPU, memory, network, and battery resources.</a:t>
+            </a:r>
+          </a:p>
+          <a:p>
+            <a:pPr marL="0" indent="0">
+              <a:buNone/>
+            </a:pPr>
+            <a:r>
+              <a:rPr lang="en-US" sz="2400" dirty="0">
+                <a:solidFill>
+                  <a:srgbClr val="202124"/>
+                </a:solidFill>
+                <a:latin typeface="+mj-lt"/>
+              </a:rPr>
+              <a:t>Try to run your app and click the tool windows bar on ‘Profiler’</a:t>
+            </a:r>
+          </a:p>
+        </p:txBody>
+      </p:sp>
+      <p:pic>
+        <p:nvPicPr>
+          <p:cNvPr id="7" name="Immagine 6" descr="Immagine che contiene testo, screenshot, interni, monitor&#10;&#10;Descrizione generata automaticamente">
+            <a:extLst>
+              <a:ext uri="{FF2B5EF4-FFF2-40B4-BE49-F238E27FC236}">
+                <a16:creationId xmlns:a16="http://schemas.microsoft.com/office/drawing/2014/main" id="{66EB64AD-A237-B28F-B385-4D89FCECB747}"/>
+              </a:ext>
+            </a:extLst>
+          </p:cNvPr>
+          <p:cNvPicPr>
+            <a:picLocks noChangeAspect="1"/>
+          </p:cNvPicPr>
+          <p:nvPr/>
+        </p:nvPicPr>
+        <p:blipFill>
+          <a:blip r:embed="rId2"/>
+          <a:stretch>
+            <a:fillRect/>
+          </a:stretch>
+        </p:blipFill>
+        <p:spPr>
+          <a:xfrm>
+            <a:off x="831850" y="3529177"/>
+            <a:ext cx="10528300" cy="2743832"/>
+          </a:xfrm>
+          <a:prstGeom prst="rect">
+            <a:avLst/>
+          </a:prstGeom>
+        </p:spPr>
+      </p:pic>
+    </p:spTree>
+    <p:extLst>
+      <p:ext uri="{BB962C8B-B14F-4D97-AF65-F5344CB8AC3E}">
+        <p14:creationId xmlns:p14="http://schemas.microsoft.com/office/powerpoint/2010/main" val="787351502"/>
       </p:ext>
     </p:extLst>
   </p:cSld>
@@ -4271,6 +4945,14 @@
         <p:txBody>
           <a:bodyPr/>
           <a:lstStyle/>
+          <a:p>
+            <a:pPr marL="0" indent="0">
+              <a:buNone/>
+            </a:pPr>
+            <a:endParaRPr lang="en-US" dirty="0">
+              <a:latin typeface="+mj-lt"/>
+            </a:endParaRPr>
+          </a:p>
           <a:p>
             <a:pPr marL="0" indent="0">
               <a:buNone/>
@@ -4358,10 +5040,10 @@
       </p:grpSpPr>
       <p:sp>
         <p:nvSpPr>
-          <p:cNvPr id="2" name="Title 1">
+          <p:cNvPr id="2" name="Titolo 1">
             <a:extLst>
               <a:ext uri="{FF2B5EF4-FFF2-40B4-BE49-F238E27FC236}">
-                <a16:creationId xmlns:a16="http://schemas.microsoft.com/office/drawing/2014/main" id="{75B99564-AAAC-44E7-9EC2-4AE9F149928B}"/>
+                <a16:creationId xmlns:a16="http://schemas.microsoft.com/office/drawing/2014/main" id="{B5FB1AD1-9449-4767-85F7-BD71F1756D09}"/>
               </a:ext>
             </a:extLst>
           </p:cNvPr>
@@ -4372,180 +5054,24 @@
             <p:ph type="title"/>
           </p:nvPr>
         </p:nvSpPr>
-        <p:spPr>
-          <a:xfrm>
-            <a:off x="609600" y="274638"/>
-            <a:ext cx="10972800" cy="1143000"/>
-          </a:xfrm>
-        </p:spPr>
-        <p:txBody>
-          <a:bodyPr anchor="ctr">
-            <a:normAutofit/>
-          </a:bodyPr>
+        <p:spPr/>
+        <p:txBody>
+          <a:bodyPr/>
           <a:lstStyle/>
           <a:p>
             <a:r>
               <a:rPr lang="en-US" dirty="0"/>
-              <a:t>Create a Project</a:t>
-            </a:r>
-          </a:p>
-        </p:txBody>
-      </p:sp>
-      <p:sp>
-        <p:nvSpPr>
-          <p:cNvPr id="3" name="Content Placeholder 2">
+              <a:t>IDE</a:t>
+            </a:r>
+          </a:p>
+        </p:txBody>
+      </p:sp>
+      <p:pic>
+        <p:nvPicPr>
+          <p:cNvPr id="8" name="Immagine 7" descr="Immagine che contiene testo, elettronico&#10;&#10;Descrizione generata automaticamente">
             <a:extLst>
               <a:ext uri="{FF2B5EF4-FFF2-40B4-BE49-F238E27FC236}">
-                <a16:creationId xmlns:a16="http://schemas.microsoft.com/office/drawing/2014/main" id="{C6484512-C502-4967-BC4C-F40B78FFB9DF}"/>
-              </a:ext>
-            </a:extLst>
-          </p:cNvPr>
-          <p:cNvSpPr>
-            <a:spLocks noGrp="1"/>
-          </p:cNvSpPr>
-          <p:nvPr>
-            <p:ph sz="half" idx="1"/>
-          </p:nvPr>
-        </p:nvSpPr>
-        <p:spPr>
-          <a:xfrm>
-            <a:off x="740964" y="1655260"/>
-            <a:ext cx="4440636" cy="4525963"/>
-          </a:xfrm>
-        </p:spPr>
-        <p:txBody>
-          <a:bodyPr>
-            <a:normAutofit/>
-          </a:bodyPr>
-          <a:lstStyle/>
-          <a:p>
-            <a:pPr marL="0" indent="0">
-              <a:buNone/>
-            </a:pPr>
-            <a:r>
-              <a:rPr lang="en-US" sz="2000" dirty="0"/>
-              <a:t>Create a new project: </a:t>
-            </a:r>
-            <a:r>
-              <a:rPr lang="en-US" sz="1800" dirty="0"/>
-              <a:t> select Empty Activity </a:t>
-            </a:r>
-            <a:endParaRPr lang="en-US" sz="1800" b="1" dirty="0">
-              <a:solidFill>
-                <a:schemeClr val="accent6">
-                  <a:lumMod val="75000"/>
-                </a:schemeClr>
-              </a:solidFill>
-            </a:endParaRPr>
-          </a:p>
-          <a:p>
-            <a:pPr marL="514350" indent="-514350">
-              <a:buFont typeface="+mj-lt"/>
-              <a:buAutoNum type="arabicPeriod"/>
-            </a:pPr>
-            <a:r>
-              <a:rPr lang="en-US" sz="2000" b="1" dirty="0">
-                <a:solidFill>
-                  <a:schemeClr val="accent6">
-                    <a:lumMod val="75000"/>
-                  </a:schemeClr>
-                </a:solidFill>
-              </a:rPr>
-              <a:t>Name</a:t>
-            </a:r>
-            <a:r>
-              <a:rPr lang="en-US" sz="2000" dirty="0"/>
-              <a:t>: name of the application</a:t>
-            </a:r>
-          </a:p>
-          <a:p>
-            <a:pPr marL="514350" indent="-514350">
-              <a:buFont typeface="+mj-lt"/>
-              <a:buAutoNum type="arabicPeriod"/>
-            </a:pPr>
-            <a:r>
-              <a:rPr lang="en-US" sz="2000" b="1" dirty="0">
-                <a:solidFill>
-                  <a:schemeClr val="accent6">
-                    <a:lumMod val="75000"/>
-                  </a:schemeClr>
-                </a:solidFill>
-              </a:rPr>
-              <a:t>Package name</a:t>
-            </a:r>
-            <a:r>
-              <a:rPr lang="en-US" sz="2000" dirty="0"/>
-              <a:t>: name of package where it will be saved other classes and file in the future</a:t>
-            </a:r>
-          </a:p>
-          <a:p>
-            <a:pPr marL="514350" indent="-514350">
-              <a:buFont typeface="+mj-lt"/>
-              <a:buAutoNum type="arabicPeriod"/>
-            </a:pPr>
-            <a:r>
-              <a:rPr lang="en-US" sz="2000" b="1" dirty="0">
-                <a:solidFill>
-                  <a:schemeClr val="accent6">
-                    <a:lumMod val="75000"/>
-                  </a:schemeClr>
-                </a:solidFill>
-              </a:rPr>
-              <a:t>Save location</a:t>
-            </a:r>
-            <a:r>
-              <a:rPr lang="en-US" sz="2000" dirty="0"/>
-              <a:t>: choose a path in your PC to save the project</a:t>
-            </a:r>
-          </a:p>
-          <a:p>
-            <a:pPr marL="514350" indent="-514350">
-              <a:buFont typeface="+mj-lt"/>
-              <a:buAutoNum type="arabicPeriod"/>
-            </a:pPr>
-            <a:r>
-              <a:rPr lang="en-US" sz="2000" b="1" dirty="0">
-                <a:solidFill>
-                  <a:schemeClr val="accent6">
-                    <a:lumMod val="75000"/>
-                  </a:schemeClr>
-                </a:solidFill>
-              </a:rPr>
-              <a:t>Language</a:t>
-            </a:r>
-            <a:r>
-              <a:rPr lang="en-US" sz="2000" dirty="0"/>
-              <a:t>: language of the project</a:t>
-            </a:r>
-          </a:p>
-          <a:p>
-            <a:pPr marL="514350" indent="-514350">
-              <a:buFont typeface="+mj-lt"/>
-              <a:buAutoNum type="arabicPeriod"/>
-            </a:pPr>
-            <a:r>
-              <a:rPr lang="en-US" sz="2000" b="1" dirty="0">
-                <a:solidFill>
-                  <a:schemeClr val="accent6">
-                    <a:lumMod val="75000"/>
-                  </a:schemeClr>
-                </a:solidFill>
-              </a:rPr>
-              <a:t>Minimum SDK</a:t>
-            </a:r>
-            <a:r>
-              <a:rPr lang="en-US" sz="2000" dirty="0"/>
-              <a:t>:  version of operating system (API) for develop you application (will affect on download’s capacity on Play store)</a:t>
-            </a:r>
-          </a:p>
-        </p:txBody>
-      </p:sp>
-      <p:pic>
-        <p:nvPicPr>
-          <p:cNvPr id="7" name="Immagine 6">
-            <a:extLst>
-              <a:ext uri="{FF2B5EF4-FFF2-40B4-BE49-F238E27FC236}">
-                <a16:creationId xmlns:a16="http://schemas.microsoft.com/office/drawing/2014/main" id="{002B8C7C-70D6-4CC7-9C79-5450DF9F80F7}"/>
+                <a16:creationId xmlns:a16="http://schemas.microsoft.com/office/drawing/2014/main" id="{59A6281B-C033-EC34-5B63-412B9BF7B9A7}"/>
               </a:ext>
             </a:extLst>
           </p:cNvPr>
@@ -4555,260 +5081,31 @@
           <p:nvPr/>
         </p:nvPicPr>
         <p:blipFill>
-          <a:blip r:embed="rId2"/>
+          <a:blip r:embed="rId2">
+            <a:extLst>
+              <a:ext uri="{28A0092B-C50C-407E-A947-70E740481C1C}">
+                <a14:useLocalDpi xmlns:a14="http://schemas.microsoft.com/office/drawing/2010/main" val="0"/>
+              </a:ext>
+            </a:extLst>
+          </a:blip>
           <a:stretch>
             <a:fillRect/>
           </a:stretch>
         </p:blipFill>
         <p:spPr>
           <a:xfrm>
-            <a:off x="5501262" y="1965575"/>
-            <a:ext cx="6081138" cy="4144384"/>
+            <a:off x="1471308" y="1281289"/>
+            <a:ext cx="9249384" cy="5184421"/>
           </a:xfrm>
           <a:prstGeom prst="rect">
             <a:avLst/>
           </a:prstGeom>
         </p:spPr>
       </p:pic>
-      <p:sp>
-        <p:nvSpPr>
-          <p:cNvPr id="9" name="Ovale 8">
-            <a:extLst>
-              <a:ext uri="{FF2B5EF4-FFF2-40B4-BE49-F238E27FC236}">
-                <a16:creationId xmlns:a16="http://schemas.microsoft.com/office/drawing/2014/main" id="{CBCF378F-69D3-4CB4-A4C2-DC452EB3E143}"/>
-              </a:ext>
-            </a:extLst>
-          </p:cNvPr>
-          <p:cNvSpPr/>
-          <p:nvPr/>
-        </p:nvSpPr>
-        <p:spPr>
-          <a:xfrm>
-            <a:off x="5624518" y="2853850"/>
-            <a:ext cx="157162" cy="147638"/>
-          </a:xfrm>
-          <a:prstGeom prst="ellipse">
-            <a:avLst/>
-          </a:prstGeom>
-        </p:spPr>
-        <p:style>
-          <a:lnRef idx="1">
-            <a:schemeClr val="accent1"/>
-          </a:lnRef>
-          <a:fillRef idx="3">
-            <a:schemeClr val="accent1"/>
-          </a:fillRef>
-          <a:effectRef idx="2">
-            <a:schemeClr val="accent1"/>
-          </a:effectRef>
-          <a:fontRef idx="minor">
-            <a:schemeClr val="lt1"/>
-          </a:fontRef>
-        </p:style>
-        <p:txBody>
-          <a:bodyPr rtlCol="0" anchor="ctr"/>
-          <a:lstStyle/>
-          <a:p>
-            <a:pPr algn="ctr"/>
-            <a:r>
-              <a:rPr lang="en-US" dirty="0"/>
-              <a:t>1</a:t>
-            </a:r>
-          </a:p>
-        </p:txBody>
-      </p:sp>
-      <p:sp>
-        <p:nvSpPr>
-          <p:cNvPr id="11" name="Ovale 10">
-            <a:extLst>
-              <a:ext uri="{FF2B5EF4-FFF2-40B4-BE49-F238E27FC236}">
-                <a16:creationId xmlns:a16="http://schemas.microsoft.com/office/drawing/2014/main" id="{49076427-01AA-4C48-8AD2-1CD6F5A16C69}"/>
-              </a:ext>
-            </a:extLst>
-          </p:cNvPr>
-          <p:cNvSpPr/>
-          <p:nvPr/>
-        </p:nvSpPr>
-        <p:spPr>
-          <a:xfrm>
-            <a:off x="5631660" y="3200215"/>
-            <a:ext cx="157162" cy="147638"/>
-          </a:xfrm>
-          <a:prstGeom prst="ellipse">
-            <a:avLst/>
-          </a:prstGeom>
-        </p:spPr>
-        <p:style>
-          <a:lnRef idx="1">
-            <a:schemeClr val="accent1"/>
-          </a:lnRef>
-          <a:fillRef idx="3">
-            <a:schemeClr val="accent1"/>
-          </a:fillRef>
-          <a:effectRef idx="2">
-            <a:schemeClr val="accent1"/>
-          </a:effectRef>
-          <a:fontRef idx="minor">
-            <a:schemeClr val="lt1"/>
-          </a:fontRef>
-        </p:style>
-        <p:txBody>
-          <a:bodyPr rtlCol="0" anchor="ctr"/>
-          <a:lstStyle/>
-          <a:p>
-            <a:pPr algn="ctr"/>
-            <a:r>
-              <a:rPr lang="en-US" dirty="0"/>
-              <a:t>2</a:t>
-            </a:r>
-          </a:p>
-        </p:txBody>
-      </p:sp>
-      <p:sp>
-        <p:nvSpPr>
-          <p:cNvPr id="12" name="Ovale 11">
-            <a:extLst>
-              <a:ext uri="{FF2B5EF4-FFF2-40B4-BE49-F238E27FC236}">
-                <a16:creationId xmlns:a16="http://schemas.microsoft.com/office/drawing/2014/main" id="{7D85BD07-8AEF-4E74-B7E1-47D075C3B511}"/>
-              </a:ext>
-            </a:extLst>
-          </p:cNvPr>
-          <p:cNvSpPr/>
-          <p:nvPr/>
-        </p:nvSpPr>
-        <p:spPr>
-          <a:xfrm>
-            <a:off x="5631660" y="3484376"/>
-            <a:ext cx="157162" cy="147638"/>
-          </a:xfrm>
-          <a:prstGeom prst="ellipse">
-            <a:avLst/>
-          </a:prstGeom>
-        </p:spPr>
-        <p:style>
-          <a:lnRef idx="1">
-            <a:schemeClr val="accent1"/>
-          </a:lnRef>
-          <a:fillRef idx="3">
-            <a:schemeClr val="accent1"/>
-          </a:fillRef>
-          <a:effectRef idx="2">
-            <a:schemeClr val="accent1"/>
-          </a:effectRef>
-          <a:fontRef idx="minor">
-            <a:schemeClr val="lt1"/>
-          </a:fontRef>
-        </p:style>
-        <p:txBody>
-          <a:bodyPr rtlCol="0" anchor="ctr"/>
-          <a:lstStyle/>
-          <a:p>
-            <a:pPr algn="ctr"/>
-            <a:r>
-              <a:rPr lang="en-US" dirty="0"/>
-              <a:t>3</a:t>
-            </a:r>
-          </a:p>
-        </p:txBody>
-      </p:sp>
-      <p:sp>
-        <p:nvSpPr>
-          <p:cNvPr id="13" name="Ovale 12">
-            <a:extLst>
-              <a:ext uri="{FF2B5EF4-FFF2-40B4-BE49-F238E27FC236}">
-                <a16:creationId xmlns:a16="http://schemas.microsoft.com/office/drawing/2014/main" id="{B4C7B831-68DD-4B29-8328-00B4F1FD4108}"/>
-              </a:ext>
-            </a:extLst>
-          </p:cNvPr>
-          <p:cNvSpPr/>
-          <p:nvPr/>
-        </p:nvSpPr>
-        <p:spPr>
-          <a:xfrm>
-            <a:off x="5631660" y="3804404"/>
-            <a:ext cx="157162" cy="147638"/>
-          </a:xfrm>
-          <a:prstGeom prst="ellipse">
-            <a:avLst/>
-          </a:prstGeom>
-        </p:spPr>
-        <p:style>
-          <a:lnRef idx="1">
-            <a:schemeClr val="accent1"/>
-          </a:lnRef>
-          <a:fillRef idx="3">
-            <a:schemeClr val="accent1"/>
-          </a:fillRef>
-          <a:effectRef idx="2">
-            <a:schemeClr val="accent1"/>
-          </a:effectRef>
-          <a:fontRef idx="minor">
-            <a:schemeClr val="lt1"/>
-          </a:fontRef>
-        </p:style>
-        <p:txBody>
-          <a:bodyPr rtlCol="0" anchor="ctr"/>
-          <a:lstStyle/>
-          <a:p>
-            <a:pPr algn="ctr"/>
-            <a:r>
-              <a:rPr lang="en-US" dirty="0"/>
-              <a:t>4</a:t>
-            </a:r>
-          </a:p>
-        </p:txBody>
-      </p:sp>
-      <p:sp>
-        <p:nvSpPr>
-          <p:cNvPr id="14" name="Ovale 13">
-            <a:extLst>
-              <a:ext uri="{FF2B5EF4-FFF2-40B4-BE49-F238E27FC236}">
-                <a16:creationId xmlns:a16="http://schemas.microsoft.com/office/drawing/2014/main" id="{4A69F2AF-4F72-4E55-B088-79FFDC8E2D14}"/>
-              </a:ext>
-            </a:extLst>
-          </p:cNvPr>
-          <p:cNvSpPr/>
-          <p:nvPr/>
-        </p:nvSpPr>
-        <p:spPr>
-          <a:xfrm>
-            <a:off x="5631660" y="4121256"/>
-            <a:ext cx="157162" cy="147638"/>
-          </a:xfrm>
-          <a:prstGeom prst="ellipse">
-            <a:avLst/>
-          </a:prstGeom>
-        </p:spPr>
-        <p:style>
-          <a:lnRef idx="1">
-            <a:schemeClr val="accent1"/>
-          </a:lnRef>
-          <a:fillRef idx="3">
-            <a:schemeClr val="accent1"/>
-          </a:fillRef>
-          <a:effectRef idx="2">
-            <a:schemeClr val="accent1"/>
-          </a:effectRef>
-          <a:fontRef idx="minor">
-            <a:schemeClr val="lt1"/>
-          </a:fontRef>
-        </p:style>
-        <p:txBody>
-          <a:bodyPr rtlCol="0" anchor="ctr"/>
-          <a:lstStyle/>
-          <a:p>
-            <a:pPr algn="ctr"/>
-            <a:r>
-              <a:rPr lang="en-US" dirty="0"/>
-              <a:t>5</a:t>
-            </a:r>
-          </a:p>
-        </p:txBody>
-      </p:sp>
     </p:spTree>
     <p:extLst>
       <p:ext uri="{BB962C8B-B14F-4D97-AF65-F5344CB8AC3E}">
-        <p14:creationId xmlns:p14="http://schemas.microsoft.com/office/powerpoint/2010/main" val="695680050"/>
+        <p14:creationId xmlns:p14="http://schemas.microsoft.com/office/powerpoint/2010/main" val="2731800240"/>
       </p:ext>
     </p:extLst>
   </p:cSld>
@@ -4858,17 +5155,17 @@
           <a:p>
             <a:r>
               <a:rPr lang="en-US" dirty="0"/>
-              <a:t>IDE</a:t>
+              <a:t>Toolbar &amp; Navigation Bar</a:t>
             </a:r>
           </a:p>
         </p:txBody>
       </p:sp>
       <p:pic>
         <p:nvPicPr>
-          <p:cNvPr id="80" name="Immagine 79">
+          <p:cNvPr id="56" name="Immagine 55">
             <a:extLst>
               <a:ext uri="{FF2B5EF4-FFF2-40B4-BE49-F238E27FC236}">
-                <a16:creationId xmlns:a16="http://schemas.microsoft.com/office/drawing/2014/main" id="{9B7FE3DB-B0C6-42B5-9386-5AAC5E9902B8}"/>
+                <a16:creationId xmlns:a16="http://schemas.microsoft.com/office/drawing/2014/main" id="{F3840018-2996-4DD6-9DEA-FD3C7A4F0950}"/>
               </a:ext>
             </a:extLst>
           </p:cNvPr>
@@ -4877,32 +5174,338 @@
           </p:cNvPicPr>
           <p:nvPr/>
         </p:nvPicPr>
-        <p:blipFill>
-          <a:blip r:embed="rId2">
-            <a:extLst>
-              <a:ext uri="{28A0092B-C50C-407E-A947-70E740481C1C}">
-                <a14:useLocalDpi xmlns:a14="http://schemas.microsoft.com/office/drawing/2010/main" val="0"/>
-              </a:ext>
-            </a:extLst>
-          </a:blip>
-          <a:stretch>
-            <a:fillRect/>
-          </a:stretch>
+        <p:blipFill rotWithShape="1">
+          <a:blip r:embed="rId2"/>
+          <a:srcRect r="42239" b="96286"/>
+          <a:stretch/>
         </p:blipFill>
         <p:spPr>
           <a:xfrm>
-            <a:off x="1141108" y="1398941"/>
-            <a:ext cx="9249384" cy="5184421"/>
+            <a:off x="1048197" y="1680201"/>
+            <a:ext cx="10432578" cy="377220"/>
           </a:xfrm>
           <a:prstGeom prst="rect">
             <a:avLst/>
           </a:prstGeom>
         </p:spPr>
       </p:pic>
+      <p:sp>
+        <p:nvSpPr>
+          <p:cNvPr id="60" name="Ovale 59">
+            <a:extLst>
+              <a:ext uri="{FF2B5EF4-FFF2-40B4-BE49-F238E27FC236}">
+                <a16:creationId xmlns:a16="http://schemas.microsoft.com/office/drawing/2014/main" id="{3D418B10-1ADF-4435-BD0C-D929B363A99E}"/>
+              </a:ext>
+            </a:extLst>
+          </p:cNvPr>
+          <p:cNvSpPr/>
+          <p:nvPr/>
+        </p:nvSpPr>
+        <p:spPr>
+          <a:xfrm>
+            <a:off x="609600" y="1680201"/>
+            <a:ext cx="323215" cy="315398"/>
+          </a:xfrm>
+          <a:prstGeom prst="ellipse">
+            <a:avLst/>
+          </a:prstGeom>
+          <a:solidFill>
+            <a:schemeClr val="accent6">
+              <a:lumMod val="75000"/>
+            </a:schemeClr>
+          </a:solidFill>
+        </p:spPr>
+        <p:style>
+          <a:lnRef idx="1">
+            <a:schemeClr val="accent1"/>
+          </a:lnRef>
+          <a:fillRef idx="3">
+            <a:schemeClr val="accent1"/>
+          </a:fillRef>
+          <a:effectRef idx="2">
+            <a:schemeClr val="accent1"/>
+          </a:effectRef>
+          <a:fontRef idx="minor">
+            <a:schemeClr val="lt1"/>
+          </a:fontRef>
+        </p:style>
+        <p:txBody>
+          <a:bodyPr rtlCol="0" anchor="ctr"/>
+          <a:lstStyle/>
+          <a:p>
+            <a:pPr algn="ctr"/>
+            <a:r>
+              <a:rPr lang="en-US" b="1" dirty="0"/>
+              <a:t>1</a:t>
+            </a:r>
+          </a:p>
+        </p:txBody>
+      </p:sp>
+      <p:sp>
+        <p:nvSpPr>
+          <p:cNvPr id="3" name="CasellaDiTesto 2">
+            <a:extLst>
+              <a:ext uri="{FF2B5EF4-FFF2-40B4-BE49-F238E27FC236}">
+                <a16:creationId xmlns:a16="http://schemas.microsoft.com/office/drawing/2014/main" id="{CED26347-9809-49D9-B43D-6F87CFE8FB27}"/>
+              </a:ext>
+            </a:extLst>
+          </p:cNvPr>
+          <p:cNvSpPr txBox="1"/>
+          <p:nvPr/>
+        </p:nvSpPr>
+        <p:spPr>
+          <a:xfrm>
+            <a:off x="1048197" y="2112218"/>
+            <a:ext cx="9492778" cy="1200329"/>
+          </a:xfrm>
+          <a:prstGeom prst="rect">
+            <a:avLst/>
+          </a:prstGeom>
+          <a:noFill/>
+          <a:ln>
+            <a:noFill/>
+          </a:ln>
+        </p:spPr>
+        <p:txBody>
+          <a:bodyPr wrap="square" rtlCol="0">
+            <a:spAutoFit/>
+          </a:bodyPr>
+          <a:lstStyle/>
+          <a:p>
+            <a:r>
+              <a:rPr lang="en-US" sz="2400" dirty="0">
+                <a:solidFill>
+                  <a:sysClr val="windowText" lastClr="000000"/>
+                </a:solidFill>
+                <a:latin typeface="+mj-lt"/>
+              </a:rPr>
+              <a:t>With</a:t>
+            </a:r>
+            <a:r>
+              <a:rPr lang="en-US" sz="2400" i="0" dirty="0">
+                <a:solidFill>
+                  <a:sysClr val="windowText" lastClr="000000"/>
+                </a:solidFill>
+                <a:effectLst/>
+                <a:latin typeface="+mj-lt"/>
+              </a:rPr>
+              <a:t> </a:t>
+            </a:r>
+            <a:r>
+              <a:rPr lang="en-US" sz="2400" b="1" i="0" dirty="0">
+                <a:solidFill>
+                  <a:sysClr val="windowText" lastClr="000000"/>
+                </a:solidFill>
+                <a:effectLst/>
+                <a:latin typeface="+mj-lt"/>
+              </a:rPr>
+              <a:t>toolbar</a:t>
+            </a:r>
+            <a:r>
+              <a:rPr lang="en-US" sz="2400" i="0" dirty="0">
+                <a:solidFill>
+                  <a:sysClr val="windowText" lastClr="000000"/>
+                </a:solidFill>
+                <a:effectLst/>
+                <a:latin typeface="+mj-lt"/>
+              </a:rPr>
+              <a:t>  you can carry out a wide range of actions, including running your app and launching Android tools.</a:t>
+            </a:r>
+          </a:p>
+          <a:p>
+            <a:endParaRPr lang="en-US" sz="2400" b="1" dirty="0">
+              <a:ln>
+                <a:solidFill>
+                  <a:sysClr val="windowText" lastClr="000000"/>
+                </a:solidFill>
+              </a:ln>
+              <a:solidFill>
+                <a:schemeClr val="bg1"/>
+              </a:solidFill>
+              <a:latin typeface="+mj-lt"/>
+            </a:endParaRPr>
+          </a:p>
+        </p:txBody>
+      </p:sp>
+      <p:pic>
+        <p:nvPicPr>
+          <p:cNvPr id="22" name="Immagine 21">
+            <a:extLst>
+              <a:ext uri="{FF2B5EF4-FFF2-40B4-BE49-F238E27FC236}">
+                <a16:creationId xmlns:a16="http://schemas.microsoft.com/office/drawing/2014/main" id="{410BB16D-53A5-42D5-9547-1A51DAA4EC64}"/>
+              </a:ext>
+            </a:extLst>
+          </p:cNvPr>
+          <p:cNvPicPr>
+            <a:picLocks noChangeAspect="1"/>
+          </p:cNvPicPr>
+          <p:nvPr/>
+        </p:nvPicPr>
+        <p:blipFill rotWithShape="1">
+          <a:blip r:embed="rId2"/>
+          <a:srcRect t="3561" r="51052" b="92394"/>
+          <a:stretch/>
+        </p:blipFill>
+        <p:spPr>
+          <a:xfrm>
+            <a:off x="1048197" y="3034511"/>
+            <a:ext cx="9217632" cy="428441"/>
+          </a:xfrm>
+          <a:prstGeom prst="rect">
+            <a:avLst/>
+          </a:prstGeom>
+        </p:spPr>
+      </p:pic>
+      <p:sp>
+        <p:nvSpPr>
+          <p:cNvPr id="24" name="CasellaDiTesto 23">
+            <a:extLst>
+              <a:ext uri="{FF2B5EF4-FFF2-40B4-BE49-F238E27FC236}">
+                <a16:creationId xmlns:a16="http://schemas.microsoft.com/office/drawing/2014/main" id="{89997FF0-7FB2-44EF-BABA-1026AD3B42A3}"/>
+              </a:ext>
+            </a:extLst>
+          </p:cNvPr>
+          <p:cNvSpPr txBox="1"/>
+          <p:nvPr/>
+        </p:nvSpPr>
+        <p:spPr>
+          <a:xfrm>
+            <a:off x="1048196" y="3646785"/>
+            <a:ext cx="10432577" cy="1477328"/>
+          </a:xfrm>
+          <a:prstGeom prst="rect">
+            <a:avLst/>
+          </a:prstGeom>
+          <a:noFill/>
+        </p:spPr>
+        <p:txBody>
+          <a:bodyPr wrap="square">
+            <a:spAutoFit/>
+          </a:bodyPr>
+          <a:lstStyle/>
+          <a:p>
+            <a:r>
+              <a:rPr lang="en-US" sz="2400" b="0" i="0" dirty="0">
+                <a:solidFill>
+                  <a:srgbClr val="202124"/>
+                </a:solidFill>
+                <a:effectLst/>
+                <a:latin typeface="Roboto" panose="02000000000000000000" pitchFamily="2" charset="0"/>
+              </a:rPr>
+              <a:t>The </a:t>
+            </a:r>
+            <a:r>
+              <a:rPr lang="en-US" sz="2400" b="1" i="0" dirty="0">
+                <a:solidFill>
+                  <a:srgbClr val="202124"/>
+                </a:solidFill>
+                <a:effectLst/>
+                <a:latin typeface="Roboto" panose="02000000000000000000" pitchFamily="2" charset="0"/>
+              </a:rPr>
+              <a:t>navigation bar</a:t>
+            </a:r>
+            <a:r>
+              <a:rPr lang="en-US" sz="2400" b="0" i="0" dirty="0">
+                <a:solidFill>
+                  <a:srgbClr val="202124"/>
+                </a:solidFill>
+                <a:effectLst/>
+                <a:latin typeface="Roboto" panose="02000000000000000000" pitchFamily="2" charset="0"/>
+              </a:rPr>
+              <a:t> helps you navigate through your project and open files for editing. It provides a more compact view of the structure visible in the </a:t>
+            </a:r>
+            <a:r>
+              <a:rPr lang="en-US" sz="2400" b="1" i="0" dirty="0">
+                <a:solidFill>
+                  <a:srgbClr val="202124"/>
+                </a:solidFill>
+                <a:effectLst/>
+                <a:latin typeface="Roboto" panose="02000000000000000000" pitchFamily="2" charset="0"/>
+              </a:rPr>
+              <a:t>Project</a:t>
+            </a:r>
+            <a:r>
+              <a:rPr lang="en-US" sz="2400" b="0" i="0" dirty="0">
+                <a:solidFill>
+                  <a:srgbClr val="202124"/>
+                </a:solidFill>
+                <a:effectLst/>
+                <a:latin typeface="Roboto" panose="02000000000000000000" pitchFamily="2" charset="0"/>
+              </a:rPr>
+              <a:t> window.</a:t>
+            </a:r>
+          </a:p>
+          <a:p>
+            <a:endParaRPr lang="en-US" sz="1800" b="1" dirty="0">
+              <a:ln>
+                <a:solidFill>
+                  <a:sysClr val="windowText" lastClr="000000"/>
+                </a:solidFill>
+              </a:ln>
+              <a:solidFill>
+                <a:schemeClr val="bg1"/>
+              </a:solidFill>
+              <a:latin typeface="+mj-lt"/>
+            </a:endParaRPr>
+          </a:p>
+        </p:txBody>
+      </p:sp>
+      <p:sp>
+        <p:nvSpPr>
+          <p:cNvPr id="25" name="Ovale 24">
+            <a:extLst>
+              <a:ext uri="{FF2B5EF4-FFF2-40B4-BE49-F238E27FC236}">
+                <a16:creationId xmlns:a16="http://schemas.microsoft.com/office/drawing/2014/main" id="{03C15662-FA21-414F-ACC5-C6EAF941FD04}"/>
+              </a:ext>
+            </a:extLst>
+          </p:cNvPr>
+          <p:cNvSpPr/>
+          <p:nvPr/>
+        </p:nvSpPr>
+        <p:spPr>
+          <a:xfrm>
+            <a:off x="609599" y="3091032"/>
+            <a:ext cx="323215" cy="315398"/>
+          </a:xfrm>
+          <a:prstGeom prst="ellipse">
+            <a:avLst/>
+          </a:prstGeom>
+          <a:solidFill>
+            <a:schemeClr val="accent6">
+              <a:lumMod val="75000"/>
+            </a:schemeClr>
+          </a:solidFill>
+        </p:spPr>
+        <p:style>
+          <a:lnRef idx="1">
+            <a:schemeClr val="accent1"/>
+          </a:lnRef>
+          <a:fillRef idx="3">
+            <a:schemeClr val="accent1"/>
+          </a:fillRef>
+          <a:effectRef idx="2">
+            <a:schemeClr val="accent1"/>
+          </a:effectRef>
+          <a:fontRef idx="minor">
+            <a:schemeClr val="lt1"/>
+          </a:fontRef>
+        </p:style>
+        <p:txBody>
+          <a:bodyPr rtlCol="0" anchor="ctr"/>
+          <a:lstStyle/>
+          <a:p>
+            <a:pPr algn="ctr"/>
+            <a:r>
+              <a:rPr lang="en-US" b="1" dirty="0"/>
+              <a:t>2</a:t>
+            </a:r>
+          </a:p>
+        </p:txBody>
+      </p:sp>
     </p:spTree>
     <p:extLst>
       <p:ext uri="{BB962C8B-B14F-4D97-AF65-F5344CB8AC3E}">
-        <p14:creationId xmlns:p14="http://schemas.microsoft.com/office/powerpoint/2010/main" val="2731800240"/>
+        <p14:creationId xmlns:p14="http://schemas.microsoft.com/office/powerpoint/2010/main" val="4111151225"/>
       </p:ext>
     </p:extLst>
   </p:cSld>
@@ -4931,10 +5534,10 @@
       </p:grpSpPr>
       <p:sp>
         <p:nvSpPr>
-          <p:cNvPr id="2" name="Titolo 1">
+          <p:cNvPr id="19" name="Title 1">
             <a:extLst>
               <a:ext uri="{FF2B5EF4-FFF2-40B4-BE49-F238E27FC236}">
-                <a16:creationId xmlns:a16="http://schemas.microsoft.com/office/drawing/2014/main" id="{B5FB1AD1-9449-4767-85F7-BD71F1756D09}"/>
+                <a16:creationId xmlns:a16="http://schemas.microsoft.com/office/drawing/2014/main" id="{2FB06391-818F-D048-28EA-88A13608134C}"/>
               </a:ext>
             </a:extLst>
           </p:cNvPr>
@@ -4945,24 +5548,166 @@
             <p:ph type="title"/>
           </p:nvPr>
         </p:nvSpPr>
-        <p:spPr/>
+        <p:spPr>
+          <a:xfrm>
+            <a:off x="609600" y="274638"/>
+            <a:ext cx="10972800" cy="1143000"/>
+          </a:xfrm>
+        </p:spPr>
         <p:txBody>
           <a:bodyPr/>
           <a:lstStyle/>
           <a:p>
             <a:r>
               <a:rPr lang="en-US" dirty="0"/>
-              <a:t>Toolbar &amp; Navigation Bar</a:t>
-            </a:r>
+              <a:t>Editor window &amp; Tool window bar</a:t>
+            </a:r>
+          </a:p>
+        </p:txBody>
+      </p:sp>
+      <p:sp>
+        <p:nvSpPr>
+          <p:cNvPr id="21" name="Content Placeholder 2">
+            <a:extLst>
+              <a:ext uri="{FF2B5EF4-FFF2-40B4-BE49-F238E27FC236}">
+                <a16:creationId xmlns:a16="http://schemas.microsoft.com/office/drawing/2014/main" id="{4D9C6C3C-C064-A79A-83A0-F2D1EEE0196F}"/>
+              </a:ext>
+            </a:extLst>
+          </p:cNvPr>
+          <p:cNvSpPr>
+            <a:spLocks noGrp="1"/>
+          </p:cNvSpPr>
+          <p:nvPr>
+            <p:ph sz="half" idx="1"/>
+          </p:nvPr>
+        </p:nvSpPr>
+        <p:spPr>
+          <a:xfrm>
+            <a:off x="606721" y="2449854"/>
+            <a:ext cx="5384800" cy="2826656"/>
+          </a:xfrm>
+        </p:spPr>
+        <p:txBody>
+          <a:bodyPr/>
+          <a:lstStyle/>
+          <a:p>
+            <a:pPr marL="0" indent="0">
+              <a:buNone/>
+            </a:pPr>
+            <a:r>
+              <a:rPr lang="en-US" sz="2000" dirty="0">
+                <a:solidFill>
+                  <a:srgbClr val="202124"/>
+                </a:solidFill>
+                <a:latin typeface="+mj-lt"/>
+              </a:rPr>
+              <a:t>With</a:t>
+            </a:r>
+            <a:r>
+              <a:rPr lang="en-US" sz="2000" b="0" i="0" dirty="0">
+                <a:solidFill>
+                  <a:srgbClr val="202124"/>
+                </a:solidFill>
+                <a:effectLst/>
+                <a:latin typeface="+mj-lt"/>
+              </a:rPr>
+              <a:t> </a:t>
+            </a:r>
+            <a:r>
+              <a:rPr lang="en-US" sz="2000" b="1" i="0" dirty="0">
+                <a:solidFill>
+                  <a:srgbClr val="202124"/>
+                </a:solidFill>
+                <a:effectLst/>
+                <a:latin typeface="+mj-lt"/>
+              </a:rPr>
+              <a:t>editor window</a:t>
+            </a:r>
+            <a:r>
+              <a:rPr lang="en-US" sz="2000" b="0" i="0" dirty="0">
+                <a:solidFill>
+                  <a:srgbClr val="202124"/>
+                </a:solidFill>
+                <a:effectLst/>
+                <a:latin typeface="+mj-lt"/>
+              </a:rPr>
+              <a:t>  allows you to create and modify code. Depending on the current file type, the editor can change. </a:t>
+            </a:r>
+            <a:endParaRPr lang="en-US" sz="2000" dirty="0">
+              <a:solidFill>
+                <a:srgbClr val="202124"/>
+              </a:solidFill>
+              <a:latin typeface="+mj-lt"/>
+            </a:endParaRPr>
+          </a:p>
+          <a:p>
+            <a:pPr marL="0" indent="0">
+              <a:buNone/>
+            </a:pPr>
+            <a:endParaRPr lang="en-US" dirty="0">
+              <a:solidFill>
+                <a:srgbClr val="202124"/>
+              </a:solidFill>
+              <a:latin typeface="+mj-lt"/>
+            </a:endParaRPr>
+          </a:p>
+          <a:p>
+            <a:pPr marL="0" indent="0">
+              <a:buNone/>
+            </a:pPr>
+            <a:r>
+              <a:rPr lang="en-US" sz="1800" b="1" dirty="0">
+                <a:solidFill>
+                  <a:srgbClr val="202124"/>
+                </a:solidFill>
+                <a:latin typeface="+mj-lt"/>
+              </a:rPr>
+              <a:t>T</a:t>
+            </a:r>
+            <a:r>
+              <a:rPr lang="en-US" sz="1800" b="1" i="0" dirty="0">
+                <a:solidFill>
+                  <a:srgbClr val="202124"/>
+                </a:solidFill>
+                <a:effectLst/>
+                <a:latin typeface="+mj-lt"/>
+              </a:rPr>
+              <a:t>ool window bar</a:t>
+            </a:r>
+            <a:r>
+              <a:rPr lang="en-US" sz="1800" b="0" i="0" dirty="0">
+                <a:solidFill>
+                  <a:srgbClr val="202124"/>
+                </a:solidFill>
+                <a:effectLst/>
+                <a:latin typeface="+mj-lt"/>
+              </a:rPr>
+              <a:t> runs around the outside of the IDE window and contains the buttons that allow you to expand or collapse individual tool windows.</a:t>
+            </a:r>
+          </a:p>
+          <a:p>
+            <a:pPr marL="0" indent="0">
+              <a:buNone/>
+            </a:pPr>
+            <a:endParaRPr lang="en-US" sz="2000" b="0" i="0" dirty="0">
+              <a:solidFill>
+                <a:srgbClr val="202124"/>
+              </a:solidFill>
+              <a:effectLst/>
+              <a:latin typeface="+mj-lt"/>
+            </a:endParaRPr>
+          </a:p>
+          <a:p>
+            <a:endParaRPr lang="en-US" dirty="0"/>
           </a:p>
         </p:txBody>
       </p:sp>
       <p:pic>
         <p:nvPicPr>
-          <p:cNvPr id="56" name="Immagine 55">
+          <p:cNvPr id="14" name="Immagine 13">
             <a:extLst>
               <a:ext uri="{FF2B5EF4-FFF2-40B4-BE49-F238E27FC236}">
-                <a16:creationId xmlns:a16="http://schemas.microsoft.com/office/drawing/2014/main" id="{F3840018-2996-4DD6-9DEA-FD3C7A4F0950}"/>
+                <a16:creationId xmlns:a16="http://schemas.microsoft.com/office/drawing/2014/main" id="{477C4E98-F1D0-4759-A4FD-5977907ED844}"/>
               </a:ext>
             </a:extLst>
           </p:cNvPr>
@@ -4971,27 +5716,29 @@
           </p:cNvPicPr>
           <p:nvPr/>
         </p:nvPicPr>
-        <p:blipFill rotWithShape="1">
-          <a:blip r:embed="rId2"/>
-          <a:srcRect r="42239" b="96286"/>
-          <a:stretch/>
+        <p:blipFill>
+          <a:blip r:embed="rId3"/>
+          <a:stretch>
+            <a:fillRect/>
+          </a:stretch>
         </p:blipFill>
         <p:spPr>
           <a:xfrm>
-            <a:off x="1048197" y="1680201"/>
-            <a:ext cx="10432578" cy="377220"/>
+            <a:off x="6197602" y="2214087"/>
+            <a:ext cx="5384800" cy="3298190"/>
           </a:xfrm>
           <a:prstGeom prst="rect">
             <a:avLst/>
           </a:prstGeom>
+          <a:noFill/>
         </p:spPr>
       </p:pic>
       <p:sp>
         <p:nvSpPr>
-          <p:cNvPr id="60" name="Ovale 59">
+          <p:cNvPr id="6" name="Ovale 5">
             <a:extLst>
               <a:ext uri="{FF2B5EF4-FFF2-40B4-BE49-F238E27FC236}">
-                <a16:creationId xmlns:a16="http://schemas.microsoft.com/office/drawing/2014/main" id="{3D418B10-1ADF-4435-BD0C-D929B363A99E}"/>
+                <a16:creationId xmlns:a16="http://schemas.microsoft.com/office/drawing/2014/main" id="{16F3D032-F0DE-A3B3-450D-EBB32A66882A}"/>
               </a:ext>
             </a:extLst>
           </p:cNvPr>
@@ -5000,8 +5747,8 @@
         </p:nvSpPr>
         <p:spPr>
           <a:xfrm>
-            <a:off x="609600" y="1680201"/>
-            <a:ext cx="323215" cy="315398"/>
+            <a:off x="7401519" y="2594602"/>
+            <a:ext cx="208956" cy="234324"/>
           </a:xfrm>
           <a:prstGeom prst="ellipse">
             <a:avLst/>
@@ -5033,236 +5780,37 @@
             <a:pPr algn="ctr"/>
             <a:r>
               <a:rPr lang="en-US" b="1" dirty="0"/>
-              <a:t>1</a:t>
-            </a:r>
-          </a:p>
-        </p:txBody>
-      </p:sp>
-      <p:sp>
-        <p:nvSpPr>
-          <p:cNvPr id="3" name="CasellaDiTesto 2">
+              <a:t>3</a:t>
+            </a:r>
+          </a:p>
+        </p:txBody>
+      </p:sp>
+      <p:sp>
+        <p:nvSpPr>
+          <p:cNvPr id="3" name="Rettangolo 2">
             <a:extLst>
               <a:ext uri="{FF2B5EF4-FFF2-40B4-BE49-F238E27FC236}">
-                <a16:creationId xmlns:a16="http://schemas.microsoft.com/office/drawing/2014/main" id="{CED26347-9809-49D9-B43D-6F87CFE8FB27}"/>
+                <a16:creationId xmlns:a16="http://schemas.microsoft.com/office/drawing/2014/main" id="{CDB13A28-A675-2BCD-B4E6-83221939F8B8}"/>
               </a:ext>
             </a:extLst>
           </p:cNvPr>
-          <p:cNvSpPr txBox="1"/>
+          <p:cNvSpPr/>
           <p:nvPr/>
         </p:nvSpPr>
         <p:spPr>
           <a:xfrm>
-            <a:off x="1048197" y="2112218"/>
-            <a:ext cx="9492778" cy="1200329"/>
+            <a:off x="6197602" y="2214087"/>
+            <a:ext cx="126998" cy="3170713"/>
           </a:xfrm>
           <a:prstGeom prst="rect">
             <a:avLst/>
           </a:prstGeom>
           <a:noFill/>
           <a:ln>
-            <a:noFill/>
+            <a:solidFill>
+              <a:srgbClr val="FF0000"/>
+            </a:solidFill>
           </a:ln>
-        </p:spPr>
-        <p:txBody>
-          <a:bodyPr wrap="square" rtlCol="0">
-            <a:spAutoFit/>
-          </a:bodyPr>
-          <a:lstStyle/>
-          <a:p>
-            <a:r>
-              <a:rPr lang="en-US" sz="2400" i="0" dirty="0">
-                <a:solidFill>
-                  <a:sysClr val="windowText" lastClr="000000"/>
-                </a:solidFill>
-                <a:effectLst/>
-                <a:latin typeface="+mj-lt"/>
-              </a:rPr>
-              <a:t>The </a:t>
-            </a:r>
-            <a:r>
-              <a:rPr lang="en-US" sz="2400" b="1" i="0" dirty="0">
-                <a:solidFill>
-                  <a:sysClr val="windowText" lastClr="000000"/>
-                </a:solidFill>
-                <a:effectLst/>
-                <a:latin typeface="+mj-lt"/>
-              </a:rPr>
-              <a:t>toolbar</a:t>
-            </a:r>
-            <a:r>
-              <a:rPr lang="en-US" sz="2400" i="0" dirty="0">
-                <a:solidFill>
-                  <a:sysClr val="windowText" lastClr="000000"/>
-                </a:solidFill>
-                <a:effectLst/>
-                <a:latin typeface="+mj-lt"/>
-              </a:rPr>
-              <a:t> lets you carry out a wide range of actions, including running your app and launching Android tools.</a:t>
-            </a:r>
-          </a:p>
-          <a:p>
-            <a:endParaRPr lang="en-US" sz="2400" b="1" dirty="0">
-              <a:ln>
-                <a:solidFill>
-                  <a:sysClr val="windowText" lastClr="000000"/>
-                </a:solidFill>
-              </a:ln>
-              <a:solidFill>
-                <a:schemeClr val="bg1"/>
-              </a:solidFill>
-              <a:latin typeface="+mj-lt"/>
-            </a:endParaRPr>
-          </a:p>
-        </p:txBody>
-      </p:sp>
-      <p:pic>
-        <p:nvPicPr>
-          <p:cNvPr id="22" name="Immagine 21">
-            <a:extLst>
-              <a:ext uri="{FF2B5EF4-FFF2-40B4-BE49-F238E27FC236}">
-                <a16:creationId xmlns:a16="http://schemas.microsoft.com/office/drawing/2014/main" id="{410BB16D-53A5-42D5-9547-1A51DAA4EC64}"/>
-              </a:ext>
-            </a:extLst>
-          </p:cNvPr>
-          <p:cNvPicPr>
-            <a:picLocks noChangeAspect="1"/>
-          </p:cNvPicPr>
-          <p:nvPr/>
-        </p:nvPicPr>
-        <p:blipFill rotWithShape="1">
-          <a:blip r:embed="rId2"/>
-          <a:srcRect t="3561" r="51052" b="92394"/>
-          <a:stretch/>
-        </p:blipFill>
-        <p:spPr>
-          <a:xfrm>
-            <a:off x="1048197" y="3034511"/>
-            <a:ext cx="9217632" cy="428441"/>
-          </a:xfrm>
-          <a:prstGeom prst="rect">
-            <a:avLst/>
-          </a:prstGeom>
-        </p:spPr>
-      </p:pic>
-      <p:sp>
-        <p:nvSpPr>
-          <p:cNvPr id="24" name="CasellaDiTesto 23">
-            <a:extLst>
-              <a:ext uri="{FF2B5EF4-FFF2-40B4-BE49-F238E27FC236}">
-                <a16:creationId xmlns:a16="http://schemas.microsoft.com/office/drawing/2014/main" id="{89997FF0-7FB2-44EF-BABA-1026AD3B42A3}"/>
-              </a:ext>
-            </a:extLst>
-          </p:cNvPr>
-          <p:cNvSpPr txBox="1"/>
-          <p:nvPr/>
-        </p:nvSpPr>
-        <p:spPr>
-          <a:xfrm>
-            <a:off x="1048196" y="3646785"/>
-            <a:ext cx="10432577" cy="1477328"/>
-          </a:xfrm>
-          <a:prstGeom prst="rect">
-            <a:avLst/>
-          </a:prstGeom>
-          <a:noFill/>
-        </p:spPr>
-        <p:txBody>
-          <a:bodyPr wrap="square">
-            <a:spAutoFit/>
-          </a:bodyPr>
-          <a:lstStyle/>
-          <a:p>
-            <a:r>
-              <a:rPr lang="en-US" sz="2400" b="0" i="0" dirty="0">
-                <a:solidFill>
-                  <a:srgbClr val="202124"/>
-                </a:solidFill>
-                <a:effectLst/>
-                <a:latin typeface="Roboto" panose="02000000000000000000" pitchFamily="2" charset="0"/>
-              </a:rPr>
-              <a:t>The </a:t>
-            </a:r>
-            <a:r>
-              <a:rPr lang="en-US" sz="2400" b="1" i="0" dirty="0">
-                <a:solidFill>
-                  <a:srgbClr val="202124"/>
-                </a:solidFill>
-                <a:effectLst/>
-                <a:latin typeface="Roboto" panose="02000000000000000000" pitchFamily="2" charset="0"/>
-              </a:rPr>
-              <a:t>navigation bar</a:t>
-            </a:r>
-            <a:r>
-              <a:rPr lang="en-US" sz="2400" b="0" i="0" dirty="0">
-                <a:solidFill>
-                  <a:srgbClr val="202124"/>
-                </a:solidFill>
-                <a:effectLst/>
-                <a:latin typeface="Roboto" panose="02000000000000000000" pitchFamily="2" charset="0"/>
-              </a:rPr>
-              <a:t> helps you navigate through your project and open files for editing. It provides a more compact view of the structure visible in the </a:t>
-            </a:r>
-            <a:r>
-              <a:rPr lang="en-US" sz="2400" b="1" i="0" dirty="0">
-                <a:solidFill>
-                  <a:srgbClr val="202124"/>
-                </a:solidFill>
-                <a:effectLst/>
-                <a:latin typeface="Roboto" panose="02000000000000000000" pitchFamily="2" charset="0"/>
-              </a:rPr>
-              <a:t>Project</a:t>
-            </a:r>
-            <a:r>
-              <a:rPr lang="en-US" sz="2400" b="0" i="0" dirty="0">
-                <a:solidFill>
-                  <a:srgbClr val="202124"/>
-                </a:solidFill>
-                <a:effectLst/>
-                <a:latin typeface="Roboto" panose="02000000000000000000" pitchFamily="2" charset="0"/>
-              </a:rPr>
-              <a:t> window.</a:t>
-            </a:r>
-          </a:p>
-          <a:p>
-            <a:endParaRPr lang="en-US" sz="1800" b="1" dirty="0">
-              <a:ln>
-                <a:solidFill>
-                  <a:sysClr val="windowText" lastClr="000000"/>
-                </a:solidFill>
-              </a:ln>
-              <a:solidFill>
-                <a:schemeClr val="bg1"/>
-              </a:solidFill>
-              <a:latin typeface="+mj-lt"/>
-            </a:endParaRPr>
-          </a:p>
-        </p:txBody>
-      </p:sp>
-      <p:sp>
-        <p:nvSpPr>
-          <p:cNvPr id="25" name="Ovale 24">
-            <a:extLst>
-              <a:ext uri="{FF2B5EF4-FFF2-40B4-BE49-F238E27FC236}">
-                <a16:creationId xmlns:a16="http://schemas.microsoft.com/office/drawing/2014/main" id="{03C15662-FA21-414F-ACC5-C6EAF941FD04}"/>
-              </a:ext>
-            </a:extLst>
-          </p:cNvPr>
-          <p:cNvSpPr/>
-          <p:nvPr/>
-        </p:nvSpPr>
-        <p:spPr>
-          <a:xfrm>
-            <a:off x="609599" y="3091032"/>
-            <a:ext cx="323215" cy="315398"/>
-          </a:xfrm>
-          <a:prstGeom prst="ellipse">
-            <a:avLst/>
-          </a:prstGeom>
-          <a:solidFill>
-            <a:schemeClr val="accent6">
-              <a:lumMod val="75000"/>
-            </a:schemeClr>
-          </a:solidFill>
         </p:spPr>
         <p:style>
           <a:lnRef idx="1">
@@ -5283,9 +5831,307 @@
           <a:lstStyle/>
           <a:p>
             <a:pPr algn="ctr"/>
+            <a:endParaRPr lang="en-US"/>
+          </a:p>
+        </p:txBody>
+      </p:sp>
+      <p:sp>
+        <p:nvSpPr>
+          <p:cNvPr id="8" name="Rettangolo 7">
+            <a:extLst>
+              <a:ext uri="{FF2B5EF4-FFF2-40B4-BE49-F238E27FC236}">
+                <a16:creationId xmlns:a16="http://schemas.microsoft.com/office/drawing/2014/main" id="{7A7F77A4-11FC-205E-3B0D-DA09A295E221}"/>
+              </a:ext>
+            </a:extLst>
+          </p:cNvPr>
+          <p:cNvSpPr/>
+          <p:nvPr/>
+        </p:nvSpPr>
+        <p:spPr>
+          <a:xfrm>
+            <a:off x="11455402" y="2214087"/>
+            <a:ext cx="126998" cy="3170713"/>
+          </a:xfrm>
+          <a:prstGeom prst="rect">
+            <a:avLst/>
+          </a:prstGeom>
+          <a:noFill/>
+          <a:ln>
+            <a:solidFill>
+              <a:srgbClr val="FF0000"/>
+            </a:solidFill>
+          </a:ln>
+        </p:spPr>
+        <p:style>
+          <a:lnRef idx="1">
+            <a:schemeClr val="accent1"/>
+          </a:lnRef>
+          <a:fillRef idx="3">
+            <a:schemeClr val="accent1"/>
+          </a:fillRef>
+          <a:effectRef idx="2">
+            <a:schemeClr val="accent1"/>
+          </a:effectRef>
+          <a:fontRef idx="minor">
+            <a:schemeClr val="lt1"/>
+          </a:fontRef>
+        </p:style>
+        <p:txBody>
+          <a:bodyPr rtlCol="0" anchor="ctr"/>
+          <a:lstStyle/>
+          <a:p>
+            <a:pPr algn="ctr"/>
+            <a:endParaRPr lang="en-US"/>
+          </a:p>
+        </p:txBody>
+      </p:sp>
+      <p:sp>
+        <p:nvSpPr>
+          <p:cNvPr id="9" name="Rettangolo 8">
+            <a:extLst>
+              <a:ext uri="{FF2B5EF4-FFF2-40B4-BE49-F238E27FC236}">
+                <a16:creationId xmlns:a16="http://schemas.microsoft.com/office/drawing/2014/main" id="{7044759E-E240-08FE-A037-9101F6AFB1BF}"/>
+              </a:ext>
+            </a:extLst>
+          </p:cNvPr>
+          <p:cNvSpPr/>
+          <p:nvPr/>
+        </p:nvSpPr>
+        <p:spPr>
+          <a:xfrm>
+            <a:off x="6197602" y="5384800"/>
+            <a:ext cx="5384798" cy="127477"/>
+          </a:xfrm>
+          <a:prstGeom prst="rect">
+            <a:avLst/>
+          </a:prstGeom>
+          <a:noFill/>
+          <a:ln>
+            <a:solidFill>
+              <a:srgbClr val="FF0000"/>
+            </a:solidFill>
+          </a:ln>
+        </p:spPr>
+        <p:style>
+          <a:lnRef idx="1">
+            <a:schemeClr val="accent1"/>
+          </a:lnRef>
+          <a:fillRef idx="3">
+            <a:schemeClr val="accent1"/>
+          </a:fillRef>
+          <a:effectRef idx="2">
+            <a:schemeClr val="accent1"/>
+          </a:effectRef>
+          <a:fontRef idx="minor">
+            <a:schemeClr val="lt1"/>
+          </a:fontRef>
+        </p:style>
+        <p:txBody>
+          <a:bodyPr rtlCol="0" anchor="ctr"/>
+          <a:lstStyle/>
+          <a:p>
+            <a:pPr algn="ctr"/>
+            <a:endParaRPr lang="en-US"/>
+          </a:p>
+        </p:txBody>
+      </p:sp>
+      <p:sp>
+        <p:nvSpPr>
+          <p:cNvPr id="10" name="Ovale 9">
+            <a:extLst>
+              <a:ext uri="{FF2B5EF4-FFF2-40B4-BE49-F238E27FC236}">
+                <a16:creationId xmlns:a16="http://schemas.microsoft.com/office/drawing/2014/main" id="{F82B5E3F-928F-7626-5508-8FACBB774342}"/>
+              </a:ext>
+            </a:extLst>
+          </p:cNvPr>
+          <p:cNvSpPr/>
+          <p:nvPr/>
+        </p:nvSpPr>
+        <p:spPr>
+          <a:xfrm>
+            <a:off x="5782567" y="3682282"/>
+            <a:ext cx="208956" cy="234324"/>
+          </a:xfrm>
+          <a:prstGeom prst="ellipse">
+            <a:avLst/>
+          </a:prstGeom>
+          <a:solidFill>
+            <a:schemeClr val="accent6">
+              <a:lumMod val="75000"/>
+            </a:schemeClr>
+          </a:solidFill>
+        </p:spPr>
+        <p:style>
+          <a:lnRef idx="1">
+            <a:schemeClr val="accent1"/>
+          </a:lnRef>
+          <a:fillRef idx="3">
+            <a:schemeClr val="accent1"/>
+          </a:fillRef>
+          <a:effectRef idx="2">
+            <a:schemeClr val="accent1"/>
+          </a:effectRef>
+          <a:fontRef idx="minor">
+            <a:schemeClr val="lt1"/>
+          </a:fontRef>
+        </p:style>
+        <p:txBody>
+          <a:bodyPr rtlCol="0" anchor="ctr"/>
+          <a:lstStyle/>
+          <a:p>
+            <a:pPr algn="ctr"/>
             <a:r>
               <a:rPr lang="en-US" b="1" dirty="0"/>
-              <a:t>2</a:t>
+              <a:t>4</a:t>
+            </a:r>
+          </a:p>
+        </p:txBody>
+      </p:sp>
+      <p:cxnSp>
+        <p:nvCxnSpPr>
+          <p:cNvPr id="5" name="Connettore diritto 4">
+            <a:extLst>
+              <a:ext uri="{FF2B5EF4-FFF2-40B4-BE49-F238E27FC236}">
+                <a16:creationId xmlns:a16="http://schemas.microsoft.com/office/drawing/2014/main" id="{BF57533F-847C-AEB7-1189-038E2D6F3299}"/>
+              </a:ext>
+            </a:extLst>
+          </p:cNvPr>
+          <p:cNvCxnSpPr>
+            <a:cxnSpLocks/>
+            <a:stCxn id="10" idx="6"/>
+            <a:endCxn id="3" idx="1"/>
+          </p:cNvCxnSpPr>
+          <p:nvPr/>
+        </p:nvCxnSpPr>
+        <p:spPr>
+          <a:xfrm>
+            <a:off x="5991523" y="3799444"/>
+            <a:ext cx="206079" cy="0"/>
+          </a:xfrm>
+          <a:prstGeom prst="line">
+            <a:avLst/>
+          </a:prstGeom>
+          <a:ln>
+            <a:solidFill>
+              <a:srgbClr val="FF0000"/>
+            </a:solidFill>
+          </a:ln>
+        </p:spPr>
+        <p:style>
+          <a:lnRef idx="2">
+            <a:schemeClr val="accent1"/>
+          </a:lnRef>
+          <a:fillRef idx="0">
+            <a:schemeClr val="accent1"/>
+          </a:fillRef>
+          <a:effectRef idx="1">
+            <a:schemeClr val="accent1"/>
+          </a:effectRef>
+          <a:fontRef idx="minor">
+            <a:schemeClr val="tx1"/>
+          </a:fontRef>
+        </p:style>
+      </p:cxnSp>
+      <p:sp>
+        <p:nvSpPr>
+          <p:cNvPr id="18" name="Ovale 17">
+            <a:extLst>
+              <a:ext uri="{FF2B5EF4-FFF2-40B4-BE49-F238E27FC236}">
+                <a16:creationId xmlns:a16="http://schemas.microsoft.com/office/drawing/2014/main" id="{1708BF4E-DD86-D383-22EC-58776618187D}"/>
+              </a:ext>
+            </a:extLst>
+          </p:cNvPr>
+          <p:cNvSpPr/>
+          <p:nvPr/>
+        </p:nvSpPr>
+        <p:spPr>
+          <a:xfrm>
+            <a:off x="294725" y="2477440"/>
+            <a:ext cx="208956" cy="234324"/>
+          </a:xfrm>
+          <a:prstGeom prst="ellipse">
+            <a:avLst/>
+          </a:prstGeom>
+          <a:solidFill>
+            <a:schemeClr val="accent6">
+              <a:lumMod val="75000"/>
+            </a:schemeClr>
+          </a:solidFill>
+        </p:spPr>
+        <p:style>
+          <a:lnRef idx="1">
+            <a:schemeClr val="accent1"/>
+          </a:lnRef>
+          <a:fillRef idx="3">
+            <a:schemeClr val="accent1"/>
+          </a:fillRef>
+          <a:effectRef idx="2">
+            <a:schemeClr val="accent1"/>
+          </a:effectRef>
+          <a:fontRef idx="minor">
+            <a:schemeClr val="lt1"/>
+          </a:fontRef>
+        </p:style>
+        <p:txBody>
+          <a:bodyPr rtlCol="0" anchor="ctr"/>
+          <a:lstStyle/>
+          <a:p>
+            <a:pPr algn="ctr"/>
+            <a:r>
+              <a:rPr lang="en-US" b="1" dirty="0"/>
+              <a:t>3</a:t>
+            </a:r>
+          </a:p>
+        </p:txBody>
+      </p:sp>
+      <p:sp>
+        <p:nvSpPr>
+          <p:cNvPr id="20" name="Ovale 19">
+            <a:extLst>
+              <a:ext uri="{FF2B5EF4-FFF2-40B4-BE49-F238E27FC236}">
+                <a16:creationId xmlns:a16="http://schemas.microsoft.com/office/drawing/2014/main" id="{30411E12-3C80-F364-DA93-D4A65FFAA518}"/>
+              </a:ext>
+            </a:extLst>
+          </p:cNvPr>
+          <p:cNvSpPr/>
+          <p:nvPr/>
+        </p:nvSpPr>
+        <p:spPr>
+          <a:xfrm>
+            <a:off x="291844" y="4029075"/>
+            <a:ext cx="208956" cy="234324"/>
+          </a:xfrm>
+          <a:prstGeom prst="ellipse">
+            <a:avLst/>
+          </a:prstGeom>
+          <a:solidFill>
+            <a:schemeClr val="accent6">
+              <a:lumMod val="75000"/>
+            </a:schemeClr>
+          </a:solidFill>
+        </p:spPr>
+        <p:style>
+          <a:lnRef idx="1">
+            <a:schemeClr val="accent1"/>
+          </a:lnRef>
+          <a:fillRef idx="3">
+            <a:schemeClr val="accent1"/>
+          </a:fillRef>
+          <a:effectRef idx="2">
+            <a:schemeClr val="accent1"/>
+          </a:effectRef>
+          <a:fontRef idx="minor">
+            <a:schemeClr val="lt1"/>
+          </a:fontRef>
+        </p:style>
+        <p:txBody>
+          <a:bodyPr rtlCol="0" anchor="ctr"/>
+          <a:lstStyle/>
+          <a:p>
+            <a:pPr algn="ctr"/>
+            <a:r>
+              <a:rPr lang="en-US" b="1" dirty="0"/>
+              <a:t>4</a:t>
             </a:r>
           </a:p>
         </p:txBody>
@@ -5293,7 +6139,7 @@
     </p:spTree>
     <p:extLst>
       <p:ext uri="{BB962C8B-B14F-4D97-AF65-F5344CB8AC3E}">
-        <p14:creationId xmlns:p14="http://schemas.microsoft.com/office/powerpoint/2010/main" val="4111151225"/>
+        <p14:creationId xmlns:p14="http://schemas.microsoft.com/office/powerpoint/2010/main" val="2621617870"/>
       </p:ext>
     </p:extLst>
   </p:cSld>
@@ -5322,10 +6168,10 @@
       </p:grpSpPr>
       <p:sp>
         <p:nvSpPr>
-          <p:cNvPr id="19" name="Title 1">
+          <p:cNvPr id="2" name="Titolo 1">
             <a:extLst>
               <a:ext uri="{FF2B5EF4-FFF2-40B4-BE49-F238E27FC236}">
-                <a16:creationId xmlns:a16="http://schemas.microsoft.com/office/drawing/2014/main" id="{2FB06391-818F-D048-28EA-88A13608134C}"/>
+                <a16:creationId xmlns:a16="http://schemas.microsoft.com/office/drawing/2014/main" id="{779FB855-9C58-86E0-D1F7-7F5396FE380E}"/>
               </a:ext>
             </a:extLst>
           </p:cNvPr>
@@ -5336,29 +6182,209 @@
             <p:ph type="title"/>
           </p:nvPr>
         </p:nvSpPr>
-        <p:spPr>
-          <a:xfrm>
-            <a:off x="609600" y="274638"/>
-            <a:ext cx="10972800" cy="1143000"/>
-          </a:xfrm>
-        </p:spPr>
+        <p:spPr/>
         <p:txBody>
           <a:bodyPr/>
           <a:lstStyle/>
           <a:p>
             <a:r>
               <a:rPr lang="en-US" dirty="0"/>
-              <a:t>Editor window &amp; Tool window bar</a:t>
-            </a:r>
-          </a:p>
-        </p:txBody>
-      </p:sp>
-      <p:sp>
-        <p:nvSpPr>
-          <p:cNvPr id="21" name="Content Placeholder 2">
+              <a:t>Tool windows &amp; Status bar</a:t>
+            </a:r>
+          </a:p>
+        </p:txBody>
+      </p:sp>
+      <p:pic>
+        <p:nvPicPr>
+          <p:cNvPr id="12" name="Immagine 11">
             <a:extLst>
               <a:ext uri="{FF2B5EF4-FFF2-40B4-BE49-F238E27FC236}">
-                <a16:creationId xmlns:a16="http://schemas.microsoft.com/office/drawing/2014/main" id="{4D9C6C3C-C064-A79A-83A0-F2D1EEE0196F}"/>
+                <a16:creationId xmlns:a16="http://schemas.microsoft.com/office/drawing/2014/main" id="{909F1B54-89D8-7D7E-5EBE-FA715851970F}"/>
+              </a:ext>
+            </a:extLst>
+          </p:cNvPr>
+          <p:cNvPicPr>
+            <a:picLocks noChangeAspect="1"/>
+          </p:cNvPicPr>
+          <p:nvPr/>
+        </p:nvPicPr>
+        <p:blipFill rotWithShape="1">
+          <a:blip r:embed="rId2"/>
+          <a:srcRect t="4562" b="590"/>
+          <a:stretch/>
+        </p:blipFill>
+        <p:spPr>
+          <a:xfrm>
+            <a:off x="1544068" y="3429000"/>
+            <a:ext cx="8164064" cy="2584136"/>
+          </a:xfrm>
+          <a:prstGeom prst="rect">
+            <a:avLst/>
+          </a:prstGeom>
+        </p:spPr>
+      </p:pic>
+      <p:sp>
+        <p:nvSpPr>
+          <p:cNvPr id="8" name="Ovale 7">
+            <a:extLst>
+              <a:ext uri="{FF2B5EF4-FFF2-40B4-BE49-F238E27FC236}">
+                <a16:creationId xmlns:a16="http://schemas.microsoft.com/office/drawing/2014/main" id="{79C70804-0FD7-F380-78BF-430829030758}"/>
+              </a:ext>
+            </a:extLst>
+          </p:cNvPr>
+          <p:cNvSpPr/>
+          <p:nvPr/>
+        </p:nvSpPr>
+        <p:spPr>
+          <a:xfrm>
+            <a:off x="1544068" y="3429000"/>
+            <a:ext cx="208956" cy="234324"/>
+          </a:xfrm>
+          <a:prstGeom prst="ellipse">
+            <a:avLst/>
+          </a:prstGeom>
+          <a:solidFill>
+            <a:schemeClr val="accent6">
+              <a:lumMod val="75000"/>
+            </a:schemeClr>
+          </a:solidFill>
+        </p:spPr>
+        <p:style>
+          <a:lnRef idx="1">
+            <a:schemeClr val="accent1"/>
+          </a:lnRef>
+          <a:fillRef idx="3">
+            <a:schemeClr val="accent1"/>
+          </a:fillRef>
+          <a:effectRef idx="2">
+            <a:schemeClr val="accent1"/>
+          </a:effectRef>
+          <a:fontRef idx="minor">
+            <a:schemeClr val="lt1"/>
+          </a:fontRef>
+        </p:style>
+        <p:txBody>
+          <a:bodyPr rtlCol="0" anchor="ctr"/>
+          <a:lstStyle/>
+          <a:p>
+            <a:pPr algn="ctr"/>
+            <a:r>
+              <a:rPr lang="en-US" b="1" dirty="0"/>
+              <a:t>5</a:t>
+            </a:r>
+          </a:p>
+        </p:txBody>
+      </p:sp>
+      <p:sp>
+        <p:nvSpPr>
+          <p:cNvPr id="13" name="Ovale 12">
+            <a:extLst>
+              <a:ext uri="{FF2B5EF4-FFF2-40B4-BE49-F238E27FC236}">
+                <a16:creationId xmlns:a16="http://schemas.microsoft.com/office/drawing/2014/main" id="{7A1B5465-0CBB-8ABE-D2F2-C60A23339283}"/>
+              </a:ext>
+            </a:extLst>
+          </p:cNvPr>
+          <p:cNvSpPr/>
+          <p:nvPr/>
+        </p:nvSpPr>
+        <p:spPr>
+          <a:xfrm>
+            <a:off x="782068" y="5778812"/>
+            <a:ext cx="208956" cy="234324"/>
+          </a:xfrm>
+          <a:prstGeom prst="ellipse">
+            <a:avLst/>
+          </a:prstGeom>
+          <a:solidFill>
+            <a:schemeClr val="accent6">
+              <a:lumMod val="75000"/>
+            </a:schemeClr>
+          </a:solidFill>
+        </p:spPr>
+        <p:style>
+          <a:lnRef idx="1">
+            <a:schemeClr val="accent1"/>
+          </a:lnRef>
+          <a:fillRef idx="3">
+            <a:schemeClr val="accent1"/>
+          </a:fillRef>
+          <a:effectRef idx="2">
+            <a:schemeClr val="accent1"/>
+          </a:effectRef>
+          <a:fontRef idx="minor">
+            <a:schemeClr val="lt1"/>
+          </a:fontRef>
+        </p:style>
+        <p:txBody>
+          <a:bodyPr rtlCol="0" anchor="ctr"/>
+          <a:lstStyle/>
+          <a:p>
+            <a:pPr algn="ctr"/>
+            <a:r>
+              <a:rPr lang="en-US" b="1" dirty="0"/>
+              <a:t>6</a:t>
+            </a:r>
+          </a:p>
+        </p:txBody>
+      </p:sp>
+      <p:sp>
+        <p:nvSpPr>
+          <p:cNvPr id="14" name="Ovale 13">
+            <a:extLst>
+              <a:ext uri="{FF2B5EF4-FFF2-40B4-BE49-F238E27FC236}">
+                <a16:creationId xmlns:a16="http://schemas.microsoft.com/office/drawing/2014/main" id="{E2477B71-B4BC-38D2-9166-BFE762AEF374}"/>
+              </a:ext>
+            </a:extLst>
+          </p:cNvPr>
+          <p:cNvSpPr/>
+          <p:nvPr/>
+        </p:nvSpPr>
+        <p:spPr>
+          <a:xfrm>
+            <a:off x="782068" y="1689100"/>
+            <a:ext cx="208956" cy="234324"/>
+          </a:xfrm>
+          <a:prstGeom prst="ellipse">
+            <a:avLst/>
+          </a:prstGeom>
+          <a:solidFill>
+            <a:schemeClr val="accent6">
+              <a:lumMod val="75000"/>
+            </a:schemeClr>
+          </a:solidFill>
+        </p:spPr>
+        <p:style>
+          <a:lnRef idx="1">
+            <a:schemeClr val="accent1"/>
+          </a:lnRef>
+          <a:fillRef idx="3">
+            <a:schemeClr val="accent1"/>
+          </a:fillRef>
+          <a:effectRef idx="2">
+            <a:schemeClr val="accent1"/>
+          </a:effectRef>
+          <a:fontRef idx="minor">
+            <a:schemeClr val="lt1"/>
+          </a:fontRef>
+        </p:style>
+        <p:txBody>
+          <a:bodyPr rtlCol="0" anchor="ctr"/>
+          <a:lstStyle/>
+          <a:p>
+            <a:pPr algn="ctr"/>
+            <a:r>
+              <a:rPr lang="en-US" b="1" dirty="0"/>
+              <a:t>5</a:t>
+            </a:r>
+          </a:p>
+        </p:txBody>
+      </p:sp>
+      <p:sp>
+        <p:nvSpPr>
+          <p:cNvPr id="15" name="Content Placeholder 2">
+            <a:extLst>
+              <a:ext uri="{FF2B5EF4-FFF2-40B4-BE49-F238E27FC236}">
+                <a16:creationId xmlns:a16="http://schemas.microsoft.com/office/drawing/2014/main" id="{D1EFB34B-CC13-BC8A-E0E4-6FD0C0A93FAD}"/>
               </a:ext>
             </a:extLst>
           </p:cNvPr>
@@ -5371,53 +6397,189 @@
         </p:nvSpPr>
         <p:spPr>
           <a:xfrm>
-            <a:off x="609600" y="1600201"/>
-            <a:ext cx="5384800" cy="4525963"/>
-          </a:xfrm>
-        </p:spPr>
-        <p:txBody>
-          <a:bodyPr/>
+            <a:off x="1215307" y="1628946"/>
+            <a:ext cx="9761386" cy="1588746"/>
+          </a:xfrm>
+        </p:spPr>
+        <p:txBody>
+          <a:bodyPr>
+            <a:normAutofit lnSpcReduction="10000"/>
+          </a:bodyPr>
           <a:lstStyle/>
           <a:p>
-            <a:endParaRPr lang="en-US" dirty="0"/>
-          </a:p>
-        </p:txBody>
-      </p:sp>
-      <p:pic>
-        <p:nvPicPr>
-          <p:cNvPr id="14" name="Immagine 13">
+            <a:pPr marL="0" indent="0">
+              <a:buNone/>
+            </a:pPr>
+            <a:r>
+              <a:rPr lang="en-US" sz="2000" b="1" dirty="0">
+                <a:latin typeface="+mj-lt"/>
+              </a:rPr>
+              <a:t>Tool windows </a:t>
+            </a:r>
+            <a:r>
+              <a:rPr lang="en-US" sz="2000" b="0" i="0" dirty="0">
+                <a:solidFill>
+                  <a:srgbClr val="202124"/>
+                </a:solidFill>
+                <a:effectLst/>
+                <a:latin typeface="+mj-lt"/>
+              </a:rPr>
+              <a:t> give  access to specific tasks like project management, search, version control, and more. </a:t>
+            </a:r>
+          </a:p>
+          <a:p>
+            <a:pPr marL="0" indent="0">
+              <a:buNone/>
+            </a:pPr>
+            <a:endParaRPr lang="en-US" sz="2000" b="0" i="0" dirty="0">
+              <a:solidFill>
+                <a:srgbClr val="202124"/>
+              </a:solidFill>
+              <a:effectLst/>
+              <a:latin typeface="+mj-lt"/>
+            </a:endParaRPr>
+          </a:p>
+          <a:p>
+            <a:pPr marL="0" indent="0">
+              <a:buNone/>
+            </a:pPr>
+            <a:r>
+              <a:rPr lang="en-US" sz="1800" b="1" dirty="0">
+                <a:solidFill>
+                  <a:srgbClr val="202124"/>
+                </a:solidFill>
+                <a:latin typeface="Roboto" panose="02000000000000000000" pitchFamily="2" charset="0"/>
+              </a:rPr>
+              <a:t>S</a:t>
+            </a:r>
+            <a:r>
+              <a:rPr lang="en-US" sz="1800" b="1" i="0" dirty="0">
+                <a:solidFill>
+                  <a:srgbClr val="202124"/>
+                </a:solidFill>
+                <a:effectLst/>
+                <a:latin typeface="Roboto" panose="02000000000000000000" pitchFamily="2" charset="0"/>
+              </a:rPr>
+              <a:t>tatus bar</a:t>
+            </a:r>
+            <a:r>
+              <a:rPr lang="en-US" sz="1800" b="0" i="0" dirty="0">
+                <a:solidFill>
+                  <a:srgbClr val="202124"/>
+                </a:solidFill>
+                <a:effectLst/>
+                <a:latin typeface="Roboto" panose="02000000000000000000" pitchFamily="2" charset="0"/>
+              </a:rPr>
+              <a:t> displays the status of your project and the IDE itself, as well as any warnings or messages.</a:t>
+            </a:r>
+            <a:endParaRPr lang="en-US" sz="2000" b="1" dirty="0">
+              <a:latin typeface="+mj-lt"/>
+            </a:endParaRPr>
+          </a:p>
+        </p:txBody>
+      </p:sp>
+      <p:sp>
+        <p:nvSpPr>
+          <p:cNvPr id="16" name="Ovale 15">
             <a:extLst>
               <a:ext uri="{FF2B5EF4-FFF2-40B4-BE49-F238E27FC236}">
-                <a16:creationId xmlns:a16="http://schemas.microsoft.com/office/drawing/2014/main" id="{477C4E98-F1D0-4759-A4FD-5977907ED844}"/>
+                <a16:creationId xmlns:a16="http://schemas.microsoft.com/office/drawing/2014/main" id="{FDF509F5-700C-B3CD-9002-9134772A6A36}"/>
               </a:ext>
             </a:extLst>
           </p:cNvPr>
-          <p:cNvPicPr>
-            <a:picLocks noChangeAspect="1"/>
-          </p:cNvPicPr>
+          <p:cNvSpPr/>
           <p:nvPr/>
-        </p:nvPicPr>
-        <p:blipFill>
-          <a:blip r:embed="rId2"/>
-          <a:stretch>
-            <a:fillRect/>
-          </a:stretch>
-        </p:blipFill>
-        <p:spPr>
-          <a:xfrm>
-            <a:off x="6197602" y="2214087"/>
-            <a:ext cx="5384800" cy="3298190"/>
-          </a:xfrm>
-          <a:prstGeom prst="rect">
+        </p:nvSpPr>
+        <p:spPr>
+          <a:xfrm>
+            <a:off x="747019" y="2540000"/>
+            <a:ext cx="208956" cy="234324"/>
+          </a:xfrm>
+          <a:prstGeom prst="ellipse">
             <a:avLst/>
           </a:prstGeom>
-          <a:noFill/>
-        </p:spPr>
-      </p:pic>
+          <a:solidFill>
+            <a:schemeClr val="accent6">
+              <a:lumMod val="75000"/>
+            </a:schemeClr>
+          </a:solidFill>
+        </p:spPr>
+        <p:style>
+          <a:lnRef idx="1">
+            <a:schemeClr val="accent1"/>
+          </a:lnRef>
+          <a:fillRef idx="3">
+            <a:schemeClr val="accent1"/>
+          </a:fillRef>
+          <a:effectRef idx="2">
+            <a:schemeClr val="accent1"/>
+          </a:effectRef>
+          <a:fontRef idx="minor">
+            <a:schemeClr val="lt1"/>
+          </a:fontRef>
+        </p:style>
+        <p:txBody>
+          <a:bodyPr rtlCol="0" anchor="ctr"/>
+          <a:lstStyle/>
+          <a:p>
+            <a:pPr algn="ctr"/>
+            <a:r>
+              <a:rPr lang="en-US" b="1" dirty="0"/>
+              <a:t>6</a:t>
+            </a:r>
+          </a:p>
+        </p:txBody>
+      </p:sp>
+      <p:cxnSp>
+        <p:nvCxnSpPr>
+          <p:cNvPr id="18" name="Connettore diritto 17">
+            <a:extLst>
+              <a:ext uri="{FF2B5EF4-FFF2-40B4-BE49-F238E27FC236}">
+                <a16:creationId xmlns:a16="http://schemas.microsoft.com/office/drawing/2014/main" id="{A0E18C83-F385-C6A7-AF11-FC9ED92A06D6}"/>
+              </a:ext>
+            </a:extLst>
+          </p:cNvPr>
+          <p:cNvCxnSpPr>
+            <a:cxnSpLocks/>
+            <a:stCxn id="13" idx="6"/>
+          </p:cNvCxnSpPr>
+          <p:nvPr/>
+        </p:nvCxnSpPr>
+        <p:spPr>
+          <a:xfrm>
+            <a:off x="991024" y="5895974"/>
+            <a:ext cx="553044" cy="0"/>
+          </a:xfrm>
+          <a:prstGeom prst="line">
+            <a:avLst/>
+          </a:prstGeom>
+          <a:ln>
+            <a:solidFill>
+              <a:schemeClr val="accent6">
+                <a:lumMod val="75000"/>
+              </a:schemeClr>
+            </a:solidFill>
+          </a:ln>
+        </p:spPr>
+        <p:style>
+          <a:lnRef idx="2">
+            <a:schemeClr val="dk1"/>
+          </a:lnRef>
+          <a:fillRef idx="0">
+            <a:schemeClr val="dk1"/>
+          </a:fillRef>
+          <a:effectRef idx="1">
+            <a:schemeClr val="dk1"/>
+          </a:effectRef>
+          <a:fontRef idx="minor">
+            <a:schemeClr val="tx1"/>
+          </a:fontRef>
+        </p:style>
+      </p:cxnSp>
     </p:spTree>
     <p:extLst>
       <p:ext uri="{BB962C8B-B14F-4D97-AF65-F5344CB8AC3E}">
-        <p14:creationId xmlns:p14="http://schemas.microsoft.com/office/powerpoint/2010/main" val="2621617870"/>
+        <p14:creationId xmlns:p14="http://schemas.microsoft.com/office/powerpoint/2010/main" val="3722649580"/>
       </p:ext>
     </p:extLst>
   </p:cSld>
@@ -5446,10 +6608,10 @@
       </p:grpSpPr>
       <p:sp>
         <p:nvSpPr>
-          <p:cNvPr id="10" name="Title 1">
+          <p:cNvPr id="2" name="Title 1">
             <a:extLst>
               <a:ext uri="{FF2B5EF4-FFF2-40B4-BE49-F238E27FC236}">
-                <a16:creationId xmlns:a16="http://schemas.microsoft.com/office/drawing/2014/main" id="{E680C420-AA48-599F-6F71-800A30737121}"/>
+                <a16:creationId xmlns:a16="http://schemas.microsoft.com/office/drawing/2014/main" id="{2B2FC89E-EDF8-446E-A5FA-F256C1F00CFC}"/>
               </a:ext>
             </a:extLst>
           </p:cNvPr>
@@ -5467,22 +6629,24 @@
           </a:xfrm>
         </p:spPr>
         <p:txBody>
-          <a:bodyPr/>
+          <a:bodyPr anchor="ctr">
+            <a:normAutofit/>
+          </a:bodyPr>
           <a:lstStyle/>
           <a:p>
             <a:r>
               <a:rPr lang="en-US" dirty="0"/>
-              <a:t>Important note</a:t>
-            </a:r>
-          </a:p>
-        </p:txBody>
-      </p:sp>
-      <p:sp>
-        <p:nvSpPr>
-          <p:cNvPr id="3" name="Content Placeholder 2">
+              <a:t>Structure</a:t>
+            </a:r>
+          </a:p>
+        </p:txBody>
+      </p:sp>
+      <p:sp>
+        <p:nvSpPr>
+          <p:cNvPr id="14" name="Content Placeholder 2">
             <a:extLst>
               <a:ext uri="{FF2B5EF4-FFF2-40B4-BE49-F238E27FC236}">
-                <a16:creationId xmlns:a16="http://schemas.microsoft.com/office/drawing/2014/main" id="{467EC6DC-A0E3-44E1-AD38-B2D81306469B}"/>
+                <a16:creationId xmlns:a16="http://schemas.microsoft.com/office/drawing/2014/main" id="{4D178C34-38C6-70A0-314E-921F1009DE52}"/>
               </a:ext>
             </a:extLst>
           </p:cNvPr>
@@ -5496,7 +6660,7 @@
         <p:spPr>
           <a:xfrm>
             <a:off x="609600" y="1600201"/>
-            <a:ext cx="11582400" cy="4525963"/>
+            <a:ext cx="5384800" cy="4525963"/>
           </a:xfrm>
         </p:spPr>
         <p:txBody>
@@ -5509,79 +6673,114 @@
               <a:buNone/>
             </a:pPr>
             <a:r>
-              <a:rPr lang="en-US" sz="2300" b="1" dirty="0"/>
-              <a:t>Select SDK</a:t>
-            </a:r>
-            <a:r>
-              <a:rPr lang="en-US" sz="2300" dirty="0"/>
-              <a:t>: It’s important for app’s compatibility according android version on mobile device. You can use API 21:android 5.0. If you want use different SDK click on ‘Help me to choose’</a:t>
-            </a:r>
-          </a:p>
-          <a:p>
-            <a:pPr marL="0" indent="0">
-              <a:buNone/>
+              <a:rPr lang="en-US" dirty="0"/>
+              <a:t>Our project will be structured as you can see in three directory:</a:t>
+            </a:r>
+          </a:p>
+          <a:p>
+            <a:pPr>
+              <a:buFont typeface="Wingdings" panose="05000000000000000000" pitchFamily="2" charset="2"/>
+              <a:buChar char="Ø"/>
             </a:pPr>
             <a:r>
-              <a:rPr lang="en-US" sz="2300" dirty="0"/>
-              <a:t>If you don’t have any SDK installed, you can click ‘finish’ and  on IDE click: </a:t>
-            </a:r>
-          </a:p>
-          <a:p>
-            <a:pPr marL="0" indent="0">
-              <a:buNone/>
+              <a:rPr lang="en-US" sz="2400" b="1" dirty="0">
+                <a:solidFill>
+                  <a:schemeClr val="accent6">
+                    <a:lumMod val="75000"/>
+                  </a:schemeClr>
+                </a:solidFill>
+              </a:rPr>
+              <a:t>Manifest</a:t>
+            </a:r>
+            <a:r>
+              <a:rPr lang="en-US" sz="2400" dirty="0"/>
+              <a:t>: contains AndroidManifest.xml where will be declared the activity of our project</a:t>
+            </a:r>
+          </a:p>
+          <a:p>
+            <a:pPr>
+              <a:buFont typeface="Wingdings" panose="05000000000000000000" pitchFamily="2" charset="2"/>
+              <a:buChar char="Ø"/>
             </a:pPr>
             <a:r>
-              <a:rPr lang="en-US" sz="2200" b="1" dirty="0"/>
-              <a:t>File-&gt;Settings-&gt;Appearance &amp; Behavior-&gt;System Settings-&gt;Android SDK -&gt;click one SDK-&gt;apply</a:t>
-            </a:r>
-            <a:r>
-              <a:rPr lang="en-US" sz="2200" dirty="0"/>
-              <a:t>. </a:t>
-            </a:r>
-          </a:p>
-          <a:p>
-            <a:pPr marL="0" indent="0">
-              <a:buNone/>
+              <a:rPr lang="en-US" sz="2400" b="1" dirty="0">
+                <a:solidFill>
+                  <a:schemeClr val="accent6">
+                    <a:lumMod val="75000"/>
+                  </a:schemeClr>
+                </a:solidFill>
+              </a:rPr>
+              <a:t>Java:</a:t>
+            </a:r>
+            <a:r>
+              <a:rPr lang="en-US" sz="2400" b="1" dirty="0"/>
+              <a:t> </a:t>
+            </a:r>
+            <a:r>
+              <a:rPr lang="en-US" sz="2400" dirty="0"/>
+              <a:t>contains our java class</a:t>
+            </a:r>
+          </a:p>
+          <a:p>
+            <a:pPr>
+              <a:buFont typeface="Wingdings" panose="05000000000000000000" pitchFamily="2" charset="2"/>
+              <a:buChar char="Ø"/>
             </a:pPr>
             <a:r>
-              <a:rPr lang="en-US" sz="2300" dirty="0"/>
-              <a:t>Automatically android studio will install it for you.</a:t>
-            </a:r>
-          </a:p>
-          <a:p>
-            <a:pPr marL="0" indent="0">
-              <a:buNone/>
-            </a:pPr>
-            <a:endParaRPr lang="en-US" sz="2300" dirty="0"/>
-          </a:p>
-          <a:p>
-            <a:pPr marL="0" indent="0">
-              <a:buNone/>
-            </a:pPr>
-            <a:r>
-              <a:rPr lang="en-US" sz="2300" b="1" dirty="0"/>
-              <a:t>Note</a:t>
-            </a:r>
-            <a:r>
-              <a:rPr lang="en-US" sz="2300" dirty="0"/>
-              <a:t>: if you need in future to indicate SDK’s path, you can always find it on: </a:t>
-            </a:r>
-          </a:p>
-          <a:p>
-            <a:pPr marL="0" indent="0">
-              <a:buNone/>
-            </a:pPr>
-            <a:r>
-              <a:rPr lang="en-US" sz="2300" b="1" dirty="0"/>
-              <a:t>File-&gt;Settings-&gt;Appearance &amp; Behavior-&gt;System Settings-&gt;Android SDK</a:t>
-            </a:r>
-          </a:p>
-        </p:txBody>
-      </p:sp>
+              <a:rPr lang="en-US" sz="2400" b="1" dirty="0">
+                <a:solidFill>
+                  <a:schemeClr val="accent6">
+                    <a:lumMod val="75000"/>
+                  </a:schemeClr>
+                </a:solidFill>
+              </a:rPr>
+              <a:t>Res: </a:t>
+            </a:r>
+            <a:r>
+              <a:rPr lang="en-US" sz="2400" dirty="0"/>
+              <a:t>contains layout element of our app and the image, sound resource. Also, the .xml files of the classes that define their layout</a:t>
+            </a:r>
+          </a:p>
+          <a:p>
+            <a:endParaRPr lang="en-US" dirty="0"/>
+          </a:p>
+        </p:txBody>
+      </p:sp>
+      <p:pic>
+        <p:nvPicPr>
+          <p:cNvPr id="8" name="Immagine 7" descr="Immagine che contiene testo&#10;&#10;Descrizione generata automaticamente">
+            <a:extLst>
+              <a:ext uri="{FF2B5EF4-FFF2-40B4-BE49-F238E27FC236}">
+                <a16:creationId xmlns:a16="http://schemas.microsoft.com/office/drawing/2014/main" id="{45A8FAB8-24BF-4D92-928B-50C8AFB83676}"/>
+              </a:ext>
+            </a:extLst>
+          </p:cNvPr>
+          <p:cNvPicPr>
+            <a:picLocks noChangeAspect="1"/>
+          </p:cNvPicPr>
+          <p:nvPr/>
+        </p:nvPicPr>
+        <p:blipFill>
+          <a:blip r:embed="rId2"/>
+          <a:stretch>
+            <a:fillRect/>
+          </a:stretch>
+        </p:blipFill>
+        <p:spPr>
+          <a:xfrm>
+            <a:off x="6640370" y="1600201"/>
+            <a:ext cx="4499260" cy="4525963"/>
+          </a:xfrm>
+          <a:prstGeom prst="rect">
+            <a:avLst/>
+          </a:prstGeom>
+          <a:noFill/>
+        </p:spPr>
+      </p:pic>
     </p:spTree>
     <p:extLst>
       <p:ext uri="{BB962C8B-B14F-4D97-AF65-F5344CB8AC3E}">
-        <p14:creationId xmlns:p14="http://schemas.microsoft.com/office/powerpoint/2010/main" val="530826719"/>
+        <p14:creationId xmlns:p14="http://schemas.microsoft.com/office/powerpoint/2010/main" val="2982314221"/>
       </p:ext>
     </p:extLst>
   </p:cSld>
@@ -5610,10 +6809,10 @@
       </p:grpSpPr>
       <p:sp>
         <p:nvSpPr>
-          <p:cNvPr id="2" name="Title 1">
+          <p:cNvPr id="2" name="Titolo 1">
             <a:extLst>
               <a:ext uri="{FF2B5EF4-FFF2-40B4-BE49-F238E27FC236}">
-                <a16:creationId xmlns:a16="http://schemas.microsoft.com/office/drawing/2014/main" id="{2B2FC89E-EDF8-446E-A5FA-F256C1F00CFC}"/>
+                <a16:creationId xmlns:a16="http://schemas.microsoft.com/office/drawing/2014/main" id="{C8F801B8-612B-3C17-1662-3F826CB9B2AF}"/>
               </a:ext>
             </a:extLst>
           </p:cNvPr>
@@ -5637,18 +6836,21 @@
           <a:lstStyle/>
           <a:p>
             <a:r>
-              <a:rPr lang="en-US" dirty="0"/>
-              <a:t>Structure</a:t>
-            </a:r>
-          </a:p>
-        </p:txBody>
-      </p:sp>
-      <p:sp>
-        <p:nvSpPr>
-          <p:cNvPr id="14" name="Content Placeholder 2">
+              <a:rPr lang="en-US" i="0">
+                <a:effectLst/>
+              </a:rPr>
+              <a:t>Developer workflow</a:t>
+            </a:r>
+            <a:endParaRPr lang="en-US" dirty="0"/>
+          </a:p>
+        </p:txBody>
+      </p:sp>
+      <p:sp>
+        <p:nvSpPr>
+          <p:cNvPr id="3" name="Segnaposto contenuto 2">
             <a:extLst>
               <a:ext uri="{FF2B5EF4-FFF2-40B4-BE49-F238E27FC236}">
-                <a16:creationId xmlns:a16="http://schemas.microsoft.com/office/drawing/2014/main" id="{4D178C34-38C6-70A0-314E-921F1009DE52}"/>
+                <a16:creationId xmlns:a16="http://schemas.microsoft.com/office/drawing/2014/main" id="{CA019D7F-63A2-9B2C-A5B9-937775DC8823}"/>
               </a:ext>
             </a:extLst>
           </p:cNvPr>
@@ -5662,7 +6864,7 @@
         <p:spPr>
           <a:xfrm>
             <a:off x="609600" y="1600201"/>
-            <a:ext cx="5384800" cy="4525963"/>
+            <a:ext cx="11328400" cy="4525963"/>
           </a:xfrm>
         </p:spPr>
         <p:txBody>
@@ -5675,85 +6877,18 @@
               <a:buNone/>
             </a:pPr>
             <a:r>
-              <a:rPr lang="en-US" dirty="0"/>
-              <a:t>Our project will be structured as you can see in three directory:</a:t>
-            </a:r>
-          </a:p>
-          <a:p>
-            <a:pPr>
-              <a:buFont typeface="Wingdings" panose="05000000000000000000" pitchFamily="2" charset="2"/>
-              <a:buChar char="Ø"/>
-            </a:pPr>
-            <a:r>
-              <a:rPr lang="en-US" sz="2400" b="1" dirty="0">
-                <a:solidFill>
-                  <a:schemeClr val="accent6">
-                    <a:lumMod val="75000"/>
-                  </a:schemeClr>
-                </a:solidFill>
-              </a:rPr>
-              <a:t>Manifest</a:t>
-            </a:r>
-            <a:r>
               <a:rPr lang="en-US" sz="2400" dirty="0"/>
-              <a:t>: contains AndroidManifest.xml where will be declared the activity of our project</a:t>
-            </a:r>
-          </a:p>
-          <a:p>
-            <a:pPr>
-              <a:buFont typeface="Wingdings" panose="05000000000000000000" pitchFamily="2" charset="2"/>
-              <a:buChar char="Ø"/>
-            </a:pPr>
-            <a:r>
-              <a:rPr lang="en-US" sz="2400" b="1" dirty="0">
-                <a:solidFill>
-                  <a:schemeClr val="accent6">
-                    <a:lumMod val="75000"/>
-                  </a:schemeClr>
-                </a:solidFill>
-              </a:rPr>
-              <a:t>Java:</a:t>
-            </a:r>
-            <a:r>
-              <a:rPr lang="en-US" sz="2400" b="1" dirty="0"/>
-              <a:t> </a:t>
-            </a:r>
-            <a:r>
-              <a:rPr lang="en-US" sz="2400" dirty="0"/>
-              <a:t>contains our java class</a:t>
-            </a:r>
-          </a:p>
-          <a:p>
-            <a:pPr>
-              <a:buFont typeface="Wingdings" panose="05000000000000000000" pitchFamily="2" charset="2"/>
-              <a:buChar char="Ø"/>
-            </a:pPr>
-            <a:r>
-              <a:rPr lang="en-US" sz="2400" b="1" dirty="0">
-                <a:solidFill>
-                  <a:schemeClr val="accent6">
-                    <a:lumMod val="75000"/>
-                  </a:schemeClr>
-                </a:solidFill>
-              </a:rPr>
-              <a:t>Res: </a:t>
-            </a:r>
-            <a:r>
-              <a:rPr lang="en-US" sz="2400" dirty="0"/>
-              <a:t>contains layout element of our app and the image, sound resource. Also, the .xml files of the classes that define their layout</a:t>
-            </a:r>
-          </a:p>
-          <a:p>
-            <a:endParaRPr lang="en-US" dirty="0"/>
+              <a:t>The workflow must be well defined even before starting a real project, let’s see how it should be structured:</a:t>
+            </a:r>
           </a:p>
         </p:txBody>
       </p:sp>
       <p:pic>
         <p:nvPicPr>
-          <p:cNvPr id="8" name="Immagine 7" descr="Immagine che contiene testo&#10;&#10;Descrizione generata automaticamente">
+          <p:cNvPr id="5" name="Immagine 4">
             <a:extLst>
               <a:ext uri="{FF2B5EF4-FFF2-40B4-BE49-F238E27FC236}">
-                <a16:creationId xmlns:a16="http://schemas.microsoft.com/office/drawing/2014/main" id="{45A8FAB8-24BF-4D92-928B-50C8AFB83676}"/>
+                <a16:creationId xmlns:a16="http://schemas.microsoft.com/office/drawing/2014/main" id="{365F17C5-3B23-1027-0F76-FA69A322F864}"/>
               </a:ext>
             </a:extLst>
           </p:cNvPr>
@@ -5762,16 +6897,21 @@
           </p:cNvPicPr>
           <p:nvPr/>
         </p:nvPicPr>
-        <p:blipFill>
-          <a:blip r:embed="rId2"/>
-          <a:stretch>
-            <a:fillRect/>
-          </a:stretch>
+        <p:blipFill rotWithShape="1">
+          <a:blip r:embed="rId2">
+            <a:extLst>
+              <a:ext uri="{28A0092B-C50C-407E-A947-70E740481C1C}">
+                <a14:useLocalDpi xmlns:a14="http://schemas.microsoft.com/office/drawing/2010/main" val="0"/>
+              </a:ext>
+            </a:extLst>
+          </a:blip>
+          <a:srcRect t="3078" b="76882"/>
+          <a:stretch/>
         </p:blipFill>
         <p:spPr>
           <a:xfrm>
-            <a:off x="6640370" y="1600201"/>
-            <a:ext cx="4499260" cy="4525963"/>
+            <a:off x="333473" y="2525953"/>
+            <a:ext cx="3388937" cy="1331680"/>
           </a:xfrm>
           <a:prstGeom prst="rect">
             <a:avLst/>
@@ -5779,10 +6919,374 @@
           <a:noFill/>
         </p:spPr>
       </p:pic>
+      <p:pic>
+        <p:nvPicPr>
+          <p:cNvPr id="6" name="Immagine 5">
+            <a:extLst>
+              <a:ext uri="{FF2B5EF4-FFF2-40B4-BE49-F238E27FC236}">
+                <a16:creationId xmlns:a16="http://schemas.microsoft.com/office/drawing/2014/main" id="{C47AF7B4-C693-010E-AD37-90AED8CD3CEE}"/>
+              </a:ext>
+            </a:extLst>
+          </p:cNvPr>
+          <p:cNvPicPr>
+            <a:picLocks noChangeAspect="1"/>
+          </p:cNvPicPr>
+          <p:nvPr/>
+        </p:nvPicPr>
+        <p:blipFill rotWithShape="1">
+          <a:blip r:embed="rId2">
+            <a:extLst>
+              <a:ext uri="{28A0092B-C50C-407E-A947-70E740481C1C}">
+                <a14:useLocalDpi xmlns:a14="http://schemas.microsoft.com/office/drawing/2010/main" val="0"/>
+              </a:ext>
+            </a:extLst>
+          </a:blip>
+          <a:srcRect l="-413" t="25669" r="413" b="62434"/>
+          <a:stretch/>
+        </p:blipFill>
+        <p:spPr>
+          <a:xfrm>
+            <a:off x="4335906" y="2882900"/>
+            <a:ext cx="3428835" cy="799870"/>
+          </a:xfrm>
+          <a:prstGeom prst="rect">
+            <a:avLst/>
+          </a:prstGeom>
+          <a:noFill/>
+        </p:spPr>
+      </p:pic>
+      <p:pic>
+        <p:nvPicPr>
+          <p:cNvPr id="7" name="Immagine 6">
+            <a:extLst>
+              <a:ext uri="{FF2B5EF4-FFF2-40B4-BE49-F238E27FC236}">
+                <a16:creationId xmlns:a16="http://schemas.microsoft.com/office/drawing/2014/main" id="{A9269B4B-F473-C7A2-A5A7-B68919F32E04}"/>
+              </a:ext>
+            </a:extLst>
+          </p:cNvPr>
+          <p:cNvPicPr>
+            <a:picLocks noChangeAspect="1"/>
+          </p:cNvPicPr>
+          <p:nvPr/>
+        </p:nvPicPr>
+        <p:blipFill rotWithShape="1">
+          <a:blip r:embed="rId2">
+            <a:extLst>
+              <a:ext uri="{28A0092B-C50C-407E-A947-70E740481C1C}">
+                <a14:useLocalDpi xmlns:a14="http://schemas.microsoft.com/office/drawing/2010/main" val="0"/>
+              </a:ext>
+            </a:extLst>
+          </a:blip>
+          <a:srcRect l="29" t="40891" r="-29" b="40113"/>
+          <a:stretch/>
+        </p:blipFill>
+        <p:spPr>
+          <a:xfrm>
+            <a:off x="8362547" y="2525953"/>
+            <a:ext cx="3575453" cy="1331680"/>
+          </a:xfrm>
+          <a:prstGeom prst="rect">
+            <a:avLst/>
+          </a:prstGeom>
+          <a:noFill/>
+        </p:spPr>
+      </p:pic>
+      <p:pic>
+        <p:nvPicPr>
+          <p:cNvPr id="8" name="Immagine 7">
+            <a:extLst>
+              <a:ext uri="{FF2B5EF4-FFF2-40B4-BE49-F238E27FC236}">
+                <a16:creationId xmlns:a16="http://schemas.microsoft.com/office/drawing/2014/main" id="{78DE238B-62C7-80FC-E750-C48787E44437}"/>
+              </a:ext>
+            </a:extLst>
+          </p:cNvPr>
+          <p:cNvPicPr>
+            <a:picLocks noChangeAspect="1"/>
+          </p:cNvPicPr>
+          <p:nvPr/>
+        </p:nvPicPr>
+        <p:blipFill rotWithShape="1">
+          <a:blip r:embed="rId2">
+            <a:extLst>
+              <a:ext uri="{28A0092B-C50C-407E-A947-70E740481C1C}">
+                <a14:useLocalDpi xmlns:a14="http://schemas.microsoft.com/office/drawing/2010/main" val="0"/>
+              </a:ext>
+            </a:extLst>
+          </a:blip>
+          <a:srcRect l="-413" t="63459" r="413" b="17545"/>
+          <a:stretch/>
+        </p:blipFill>
+        <p:spPr>
+          <a:xfrm>
+            <a:off x="8321474" y="4523751"/>
+            <a:ext cx="3575450" cy="1331679"/>
+          </a:xfrm>
+          <a:prstGeom prst="rect">
+            <a:avLst/>
+          </a:prstGeom>
+          <a:noFill/>
+        </p:spPr>
+      </p:pic>
+      <p:pic>
+        <p:nvPicPr>
+          <p:cNvPr id="9" name="Immagine 8">
+            <a:extLst>
+              <a:ext uri="{FF2B5EF4-FFF2-40B4-BE49-F238E27FC236}">
+                <a16:creationId xmlns:a16="http://schemas.microsoft.com/office/drawing/2014/main" id="{BDED3C0C-6701-F64B-17DB-2A76A61D956F}"/>
+              </a:ext>
+            </a:extLst>
+          </p:cNvPr>
+          <p:cNvPicPr>
+            <a:picLocks noChangeAspect="1"/>
+          </p:cNvPicPr>
+          <p:nvPr/>
+        </p:nvPicPr>
+        <p:blipFill rotWithShape="1">
+          <a:blip r:embed="rId2">
+            <a:extLst>
+              <a:ext uri="{28A0092B-C50C-407E-A947-70E740481C1C}">
+                <a14:useLocalDpi xmlns:a14="http://schemas.microsoft.com/office/drawing/2010/main" val="0"/>
+              </a:ext>
+            </a:extLst>
+          </a:blip>
+          <a:srcRect l="442" t="86440" r="-442" b="1662"/>
+          <a:stretch/>
+        </p:blipFill>
+        <p:spPr>
+          <a:xfrm>
+            <a:off x="4285591" y="4711699"/>
+            <a:ext cx="3428835" cy="799870"/>
+          </a:xfrm>
+          <a:prstGeom prst="rect">
+            <a:avLst/>
+          </a:prstGeom>
+          <a:noFill/>
+        </p:spPr>
+      </p:pic>
+      <p:sp>
+        <p:nvSpPr>
+          <p:cNvPr id="14" name="Freccia a destra 13">
+            <a:extLst>
+              <a:ext uri="{FF2B5EF4-FFF2-40B4-BE49-F238E27FC236}">
+                <a16:creationId xmlns:a16="http://schemas.microsoft.com/office/drawing/2014/main" id="{E2291B89-0C4E-4137-24E2-27EBA9A120E4}"/>
+              </a:ext>
+            </a:extLst>
+          </p:cNvPr>
+          <p:cNvSpPr/>
+          <p:nvPr/>
+        </p:nvSpPr>
+        <p:spPr>
+          <a:xfrm rot="5400000">
+            <a:off x="9922219" y="3967163"/>
+            <a:ext cx="456107" cy="434828"/>
+          </a:xfrm>
+          <a:prstGeom prst="rightArrow">
+            <a:avLst/>
+          </a:prstGeom>
+          <a:solidFill>
+            <a:schemeClr val="accent6">
+              <a:lumMod val="75000"/>
+            </a:schemeClr>
+          </a:solidFill>
+        </p:spPr>
+        <p:style>
+          <a:lnRef idx="1">
+            <a:schemeClr val="accent1"/>
+          </a:lnRef>
+          <a:fillRef idx="3">
+            <a:schemeClr val="accent1"/>
+          </a:fillRef>
+          <a:effectRef idx="2">
+            <a:schemeClr val="accent1"/>
+          </a:effectRef>
+          <a:fontRef idx="minor">
+            <a:schemeClr val="lt1"/>
+          </a:fontRef>
+        </p:style>
+        <p:txBody>
+          <a:bodyPr rtlCol="0" anchor="ctr"/>
+          <a:lstStyle/>
+          <a:p>
+            <a:pPr algn="ctr"/>
+            <a:endParaRPr lang="en-US">
+              <a:solidFill>
+                <a:schemeClr val="accent6">
+                  <a:lumMod val="75000"/>
+                </a:schemeClr>
+              </a:solidFill>
+            </a:endParaRPr>
+          </a:p>
+        </p:txBody>
+      </p:sp>
+      <p:sp>
+        <p:nvSpPr>
+          <p:cNvPr id="16" name="Freccia a destra 15">
+            <a:extLst>
+              <a:ext uri="{FF2B5EF4-FFF2-40B4-BE49-F238E27FC236}">
+                <a16:creationId xmlns:a16="http://schemas.microsoft.com/office/drawing/2014/main" id="{025137B6-7444-7DA3-E66F-9C3CB3F57B53}"/>
+              </a:ext>
+            </a:extLst>
+          </p:cNvPr>
+          <p:cNvSpPr/>
+          <p:nvPr/>
+        </p:nvSpPr>
+        <p:spPr>
+          <a:xfrm>
+            <a:off x="7801514" y="2974379"/>
+            <a:ext cx="456107" cy="434828"/>
+          </a:xfrm>
+          <a:prstGeom prst="rightArrow">
+            <a:avLst/>
+          </a:prstGeom>
+          <a:solidFill>
+            <a:schemeClr val="accent6">
+              <a:lumMod val="75000"/>
+            </a:schemeClr>
+          </a:solidFill>
+        </p:spPr>
+        <p:style>
+          <a:lnRef idx="1">
+            <a:schemeClr val="accent1"/>
+          </a:lnRef>
+          <a:fillRef idx="3">
+            <a:schemeClr val="accent1"/>
+          </a:fillRef>
+          <a:effectRef idx="2">
+            <a:schemeClr val="accent1"/>
+          </a:effectRef>
+          <a:fontRef idx="minor">
+            <a:schemeClr val="lt1"/>
+          </a:fontRef>
+        </p:style>
+        <p:txBody>
+          <a:bodyPr rtlCol="0" anchor="ctr"/>
+          <a:lstStyle/>
+          <a:p>
+            <a:pPr algn="ctr"/>
+            <a:endParaRPr lang="en-US">
+              <a:solidFill>
+                <a:schemeClr val="accent6">
+                  <a:lumMod val="75000"/>
+                </a:schemeClr>
+              </a:solidFill>
+            </a:endParaRPr>
+          </a:p>
+        </p:txBody>
+      </p:sp>
+      <p:sp>
+        <p:nvSpPr>
+          <p:cNvPr id="17" name="Freccia a destra 16">
+            <a:extLst>
+              <a:ext uri="{FF2B5EF4-FFF2-40B4-BE49-F238E27FC236}">
+                <a16:creationId xmlns:a16="http://schemas.microsoft.com/office/drawing/2014/main" id="{EFB6BC14-90DF-8AB0-0EF4-40A479AB562E}"/>
+              </a:ext>
+            </a:extLst>
+          </p:cNvPr>
+          <p:cNvSpPr/>
+          <p:nvPr/>
+        </p:nvSpPr>
+        <p:spPr>
+          <a:xfrm>
+            <a:off x="3827336" y="2974379"/>
+            <a:ext cx="456107" cy="434828"/>
+          </a:xfrm>
+          <a:prstGeom prst="rightArrow">
+            <a:avLst/>
+          </a:prstGeom>
+          <a:solidFill>
+            <a:schemeClr val="accent6">
+              <a:lumMod val="75000"/>
+            </a:schemeClr>
+          </a:solidFill>
+        </p:spPr>
+        <p:style>
+          <a:lnRef idx="1">
+            <a:schemeClr val="accent1"/>
+          </a:lnRef>
+          <a:fillRef idx="3">
+            <a:schemeClr val="accent1"/>
+          </a:fillRef>
+          <a:effectRef idx="2">
+            <a:schemeClr val="accent1"/>
+          </a:effectRef>
+          <a:fontRef idx="minor">
+            <a:schemeClr val="lt1"/>
+          </a:fontRef>
+        </p:style>
+        <p:txBody>
+          <a:bodyPr rtlCol="0" anchor="ctr"/>
+          <a:lstStyle/>
+          <a:p>
+            <a:pPr algn="ctr"/>
+            <a:endParaRPr lang="en-US">
+              <a:solidFill>
+                <a:schemeClr val="accent6">
+                  <a:lumMod val="75000"/>
+                </a:schemeClr>
+              </a:solidFill>
+            </a:endParaRPr>
+          </a:p>
+        </p:txBody>
+      </p:sp>
+      <p:sp>
+        <p:nvSpPr>
+          <p:cNvPr id="18" name="Freccia a destra 17">
+            <a:extLst>
+              <a:ext uri="{FF2B5EF4-FFF2-40B4-BE49-F238E27FC236}">
+                <a16:creationId xmlns:a16="http://schemas.microsoft.com/office/drawing/2014/main" id="{1BDAAB8A-09AF-FE95-4C1D-70D7D507D174}"/>
+              </a:ext>
+            </a:extLst>
+          </p:cNvPr>
+          <p:cNvSpPr/>
+          <p:nvPr/>
+        </p:nvSpPr>
+        <p:spPr>
+          <a:xfrm rot="10800000">
+            <a:off x="7764741" y="4829059"/>
+            <a:ext cx="456107" cy="434828"/>
+          </a:xfrm>
+          <a:prstGeom prst="rightArrow">
+            <a:avLst/>
+          </a:prstGeom>
+          <a:solidFill>
+            <a:schemeClr val="accent6">
+              <a:lumMod val="75000"/>
+            </a:schemeClr>
+          </a:solidFill>
+        </p:spPr>
+        <p:style>
+          <a:lnRef idx="1">
+            <a:schemeClr val="accent1"/>
+          </a:lnRef>
+          <a:fillRef idx="3">
+            <a:schemeClr val="accent1"/>
+          </a:fillRef>
+          <a:effectRef idx="2">
+            <a:schemeClr val="accent1"/>
+          </a:effectRef>
+          <a:fontRef idx="minor">
+            <a:schemeClr val="lt1"/>
+          </a:fontRef>
+        </p:style>
+        <p:txBody>
+          <a:bodyPr rtlCol="0" anchor="ctr"/>
+          <a:lstStyle/>
+          <a:p>
+            <a:pPr algn="ctr"/>
+            <a:endParaRPr lang="en-US">
+              <a:solidFill>
+                <a:schemeClr val="accent6">
+                  <a:lumMod val="75000"/>
+                </a:schemeClr>
+              </a:solidFill>
+            </a:endParaRPr>
+          </a:p>
+        </p:txBody>
+      </p:sp>
     </p:spTree>
     <p:extLst>
       <p:ext uri="{BB962C8B-B14F-4D97-AF65-F5344CB8AC3E}">
-        <p14:creationId xmlns:p14="http://schemas.microsoft.com/office/powerpoint/2010/main" val="2982314221"/>
+        <p14:creationId xmlns:p14="http://schemas.microsoft.com/office/powerpoint/2010/main" val="2428819031"/>
       </p:ext>
     </p:extLst>
   </p:cSld>
@@ -5811,10 +7315,10 @@
       </p:grpSpPr>
       <p:sp>
         <p:nvSpPr>
-          <p:cNvPr id="2" name="Titolo 1">
+          <p:cNvPr id="2" name="Title 1">
             <a:extLst>
               <a:ext uri="{FF2B5EF4-FFF2-40B4-BE49-F238E27FC236}">
-                <a16:creationId xmlns:a16="http://schemas.microsoft.com/office/drawing/2014/main" id="{8DC1659F-7805-4EE3-ACCF-664C71D03C63}"/>
+                <a16:creationId xmlns:a16="http://schemas.microsoft.com/office/drawing/2014/main" id="{75B99564-AAAC-44E7-9EC2-4AE9F149928B}"/>
               </a:ext>
             </a:extLst>
           </p:cNvPr>
@@ -5839,17 +7343,166 @@
           <a:p>
             <a:r>
               <a:rPr lang="en-US" dirty="0"/>
-              <a:t>Create an Emulator</a:t>
+              <a:t>Create a New Project</a:t>
+            </a:r>
+          </a:p>
+        </p:txBody>
+      </p:sp>
+      <p:sp>
+        <p:nvSpPr>
+          <p:cNvPr id="3" name="Content Placeholder 2">
+            <a:extLst>
+              <a:ext uri="{FF2B5EF4-FFF2-40B4-BE49-F238E27FC236}">
+                <a16:creationId xmlns:a16="http://schemas.microsoft.com/office/drawing/2014/main" id="{C6484512-C502-4967-BC4C-F40B78FFB9DF}"/>
+              </a:ext>
+            </a:extLst>
+          </p:cNvPr>
+          <p:cNvSpPr>
+            <a:spLocks noGrp="1"/>
+          </p:cNvSpPr>
+          <p:nvPr>
+            <p:ph sz="half" idx="1"/>
+          </p:nvPr>
+        </p:nvSpPr>
+        <p:spPr>
+          <a:xfrm>
+            <a:off x="740964" y="1655260"/>
+            <a:ext cx="4440636" cy="4525963"/>
+          </a:xfrm>
+        </p:spPr>
+        <p:txBody>
+          <a:bodyPr>
+            <a:normAutofit/>
+          </a:bodyPr>
+          <a:lstStyle/>
+          <a:p>
+            <a:pPr marL="0" indent="0">
+              <a:buNone/>
+            </a:pPr>
+            <a:r>
+              <a:rPr lang="en-US" sz="2000" dirty="0"/>
+              <a:t>Create a new project: </a:t>
+            </a:r>
+            <a:r>
+              <a:rPr lang="en-US" sz="1800" dirty="0"/>
+              <a:t> select Empty Activity </a:t>
+            </a:r>
+            <a:endParaRPr lang="en-US" sz="1800" b="1" dirty="0">
+              <a:solidFill>
+                <a:schemeClr val="accent6">
+                  <a:lumMod val="75000"/>
+                </a:schemeClr>
+              </a:solidFill>
+            </a:endParaRPr>
+          </a:p>
+          <a:p>
+            <a:pPr marL="514350" indent="-514350">
+              <a:buFont typeface="+mj-lt"/>
+              <a:buAutoNum type="arabicPeriod"/>
+            </a:pPr>
+            <a:r>
+              <a:rPr lang="en-US" sz="2000" b="1" dirty="0">
+                <a:solidFill>
+                  <a:schemeClr val="accent6">
+                    <a:lumMod val="75000"/>
+                  </a:schemeClr>
+                </a:solidFill>
+              </a:rPr>
+              <a:t>Name</a:t>
+            </a:r>
+            <a:r>
+              <a:rPr lang="en-US" sz="2000" dirty="0"/>
+              <a:t>: name of the application</a:t>
+            </a:r>
+          </a:p>
+          <a:p>
+            <a:pPr marL="514350" indent="-514350">
+              <a:buFont typeface="+mj-lt"/>
+              <a:buAutoNum type="arabicPeriod"/>
+            </a:pPr>
+            <a:r>
+              <a:rPr lang="en-US" sz="2000" b="1" dirty="0">
+                <a:solidFill>
+                  <a:schemeClr val="accent6">
+                    <a:lumMod val="75000"/>
+                  </a:schemeClr>
+                </a:solidFill>
+              </a:rPr>
+              <a:t>Package name</a:t>
+            </a:r>
+            <a:r>
+              <a:rPr lang="en-US" sz="2000" dirty="0"/>
+              <a:t>: name of package where it will be saved other classes and file in the future</a:t>
+            </a:r>
+          </a:p>
+          <a:p>
+            <a:pPr marL="514350" indent="-514350">
+              <a:buFont typeface="+mj-lt"/>
+              <a:buAutoNum type="arabicPeriod"/>
+            </a:pPr>
+            <a:r>
+              <a:rPr lang="en-US" sz="2000" b="1" dirty="0">
+                <a:solidFill>
+                  <a:schemeClr val="accent6">
+                    <a:lumMod val="75000"/>
+                  </a:schemeClr>
+                </a:solidFill>
+              </a:rPr>
+              <a:t>Save location</a:t>
+            </a:r>
+            <a:r>
+              <a:rPr lang="en-US" sz="2000" dirty="0"/>
+              <a:t>: choose a path in your PC to save the project</a:t>
+            </a:r>
+          </a:p>
+          <a:p>
+            <a:pPr marL="514350" indent="-514350">
+              <a:buFont typeface="+mj-lt"/>
+              <a:buAutoNum type="arabicPeriod"/>
+            </a:pPr>
+            <a:r>
+              <a:rPr lang="en-US" sz="2000" b="1" dirty="0">
+                <a:solidFill>
+                  <a:schemeClr val="accent6">
+                    <a:lumMod val="75000"/>
+                  </a:schemeClr>
+                </a:solidFill>
+              </a:rPr>
+              <a:t>Language</a:t>
+            </a:r>
+            <a:r>
+              <a:rPr lang="en-US" sz="2000" dirty="0"/>
+              <a:t>: language of the project</a:t>
+            </a:r>
+          </a:p>
+          <a:p>
+            <a:pPr marL="514350" indent="-514350">
+              <a:buFont typeface="+mj-lt"/>
+              <a:buAutoNum type="arabicPeriod"/>
+            </a:pPr>
+            <a:r>
+              <a:rPr lang="en-US" sz="2000" b="1" dirty="0">
+                <a:solidFill>
+                  <a:schemeClr val="accent6">
+                    <a:lumMod val="75000"/>
+                  </a:schemeClr>
+                </a:solidFill>
+              </a:rPr>
+              <a:t>Minimum SDK</a:t>
+            </a:r>
+            <a:r>
+              <a:rPr lang="en-US" sz="2000" dirty="0"/>
+              <a:t>:  version of operating system (API) for develop you application (will affect on download’s capacity on Play store)</a:t>
             </a:r>
           </a:p>
         </p:txBody>
       </p:sp>
       <p:pic>
         <p:nvPicPr>
-          <p:cNvPr id="15" name="Segnaposto contenuto 8" descr="Immagine che contiene testo&#10;&#10;Descrizione generata automaticamente">
+          <p:cNvPr id="7" name="Immagine 6">
             <a:extLst>
               <a:ext uri="{FF2B5EF4-FFF2-40B4-BE49-F238E27FC236}">
-                <a16:creationId xmlns:a16="http://schemas.microsoft.com/office/drawing/2014/main" id="{D0D6A946-60C8-4CD5-B79F-A99C5A39242D}"/>
+                <a16:creationId xmlns:a16="http://schemas.microsoft.com/office/drawing/2014/main" id="{002B8C7C-70D6-4CC7-9C79-5450DF9F80F7}"/>
               </a:ext>
             </a:extLst>
           </p:cNvPr>
@@ -5866,21 +7519,20 @@
         </p:blipFill>
         <p:spPr>
           <a:xfrm>
-            <a:off x="1616770" y="2338425"/>
-            <a:ext cx="3731621" cy="4355646"/>
+            <a:off x="5501262" y="1965575"/>
+            <a:ext cx="6081138" cy="4144384"/>
           </a:xfrm>
           <a:prstGeom prst="rect">
             <a:avLst/>
           </a:prstGeom>
-          <a:noFill/>
         </p:spPr>
       </p:pic>
       <p:sp>
         <p:nvSpPr>
-          <p:cNvPr id="16" name="Rettangolo 15">
+          <p:cNvPr id="9" name="Ovale 8">
             <a:extLst>
               <a:ext uri="{FF2B5EF4-FFF2-40B4-BE49-F238E27FC236}">
-                <a16:creationId xmlns:a16="http://schemas.microsoft.com/office/drawing/2014/main" id="{26E9EB15-6994-4AFC-BC6C-13F74036DA3B}"/>
+                <a16:creationId xmlns:a16="http://schemas.microsoft.com/office/drawing/2014/main" id="{CBCF378F-69D3-4CB4-A4C2-DC452EB3E143}"/>
               </a:ext>
             </a:extLst>
           </p:cNvPr>
@@ -5889,16 +7541,22 @@
         </p:nvSpPr>
         <p:spPr>
           <a:xfrm>
-            <a:off x="5191125" y="3169422"/>
-            <a:ext cx="157266" cy="659629"/>
-          </a:xfrm>
-          <a:prstGeom prst="rect">
+            <a:off x="5624518" y="2853850"/>
+            <a:ext cx="157162" cy="147638"/>
+          </a:xfrm>
+          <a:prstGeom prst="ellipse">
             <a:avLst/>
           </a:prstGeom>
-          <a:noFill/>
-          <a:ln w="28575">
+          <a:solidFill>
+            <a:schemeClr val="accent6">
+              <a:lumMod val="75000"/>
+            </a:schemeClr>
+          </a:solidFill>
+          <a:ln>
             <a:solidFill>
-              <a:srgbClr val="FF0000"/>
+              <a:schemeClr val="accent6">
+                <a:lumMod val="75000"/>
+              </a:schemeClr>
             </a:solidFill>
           </a:ln>
         </p:spPr>
@@ -5921,49 +7579,23 @@
           <a:lstStyle/>
           <a:p>
             <a:pPr algn="ctr"/>
-            <a:endParaRPr lang="en-US" dirty="0">
-              <a:solidFill>
-                <a:srgbClr val="FF0000"/>
-              </a:solidFill>
-            </a:endParaRPr>
-          </a:p>
-        </p:txBody>
-      </p:sp>
-      <p:pic>
-        <p:nvPicPr>
-          <p:cNvPr id="4" name="Immagine 3">
+            <a:r>
+              <a:rPr lang="en-US" dirty="0">
+                <a:solidFill>
+                  <a:schemeClr val="bg1"/>
+                </a:solidFill>
+              </a:rPr>
+              <a:t>1</a:t>
+            </a:r>
+          </a:p>
+        </p:txBody>
+      </p:sp>
+      <p:sp>
+        <p:nvSpPr>
+          <p:cNvPr id="11" name="Ovale 10">
             <a:extLst>
               <a:ext uri="{FF2B5EF4-FFF2-40B4-BE49-F238E27FC236}">
-                <a16:creationId xmlns:a16="http://schemas.microsoft.com/office/drawing/2014/main" id="{6CBB09AB-C53B-4969-94C0-EE73184999A2}"/>
-              </a:ext>
-            </a:extLst>
-          </p:cNvPr>
-          <p:cNvPicPr>
-            <a:picLocks noChangeAspect="1"/>
-          </p:cNvPicPr>
-          <p:nvPr/>
-        </p:nvPicPr>
-        <p:blipFill rotWithShape="1">
-          <a:blip r:embed="rId3"/>
-          <a:srcRect b="29924"/>
-          <a:stretch/>
-        </p:blipFill>
-        <p:spPr>
-          <a:xfrm>
-            <a:off x="5942105" y="2336800"/>
-            <a:ext cx="5910383" cy="4357271"/>
-          </a:xfrm>
-          <a:prstGeom prst="rect">
-            <a:avLst/>
-          </a:prstGeom>
-        </p:spPr>
-      </p:pic>
-      <p:sp>
-        <p:nvSpPr>
-          <p:cNvPr id="8" name="Rettangolo 7">
-            <a:extLst>
-              <a:ext uri="{FF2B5EF4-FFF2-40B4-BE49-F238E27FC236}">
-                <a16:creationId xmlns:a16="http://schemas.microsoft.com/office/drawing/2014/main" id="{216FE7A6-3D9D-4730-8B9F-FC410C890274}"/>
+                <a16:creationId xmlns:a16="http://schemas.microsoft.com/office/drawing/2014/main" id="{49076427-01AA-4C48-8AD2-1CD6F5A16C69}"/>
               </a:ext>
             </a:extLst>
           </p:cNvPr>
@@ -5972,16 +7604,22 @@
         </p:nvSpPr>
         <p:spPr>
           <a:xfrm>
-            <a:off x="5989555" y="3038475"/>
-            <a:ext cx="1383702" cy="390525"/>
-          </a:xfrm>
-          <a:prstGeom prst="rect">
+            <a:off x="5631660" y="3200215"/>
+            <a:ext cx="157162" cy="147638"/>
+          </a:xfrm>
+          <a:prstGeom prst="ellipse">
             <a:avLst/>
           </a:prstGeom>
-          <a:noFill/>
-          <a:ln w="28575">
+          <a:solidFill>
+            <a:schemeClr val="accent6">
+              <a:lumMod val="75000"/>
+            </a:schemeClr>
+          </a:solidFill>
+          <a:ln>
             <a:solidFill>
-              <a:srgbClr val="FF0000"/>
+              <a:schemeClr val="accent6">
+                <a:lumMod val="75000"/>
+              </a:schemeClr>
             </a:solidFill>
           </a:ln>
         </p:spPr>
@@ -6004,59 +7642,202 @@
           <a:lstStyle/>
           <a:p>
             <a:pPr algn="ctr"/>
-            <a:endParaRPr lang="en-US" dirty="0">
-              <a:solidFill>
-                <a:srgbClr val="FF0000"/>
-              </a:solidFill>
-            </a:endParaRPr>
-          </a:p>
-        </p:txBody>
-      </p:sp>
-      <p:sp>
-        <p:nvSpPr>
-          <p:cNvPr id="10" name="CasellaDiTesto 9">
+            <a:r>
+              <a:rPr lang="en-US" dirty="0">
+                <a:solidFill>
+                  <a:schemeClr val="bg1"/>
+                </a:solidFill>
+              </a:rPr>
+              <a:t>2</a:t>
+            </a:r>
+          </a:p>
+        </p:txBody>
+      </p:sp>
+      <p:sp>
+        <p:nvSpPr>
+          <p:cNvPr id="12" name="Ovale 11">
             <a:extLst>
               <a:ext uri="{FF2B5EF4-FFF2-40B4-BE49-F238E27FC236}">
-                <a16:creationId xmlns:a16="http://schemas.microsoft.com/office/drawing/2014/main" id="{60DB8F11-E5DD-4334-9073-67679C657768}"/>
+                <a16:creationId xmlns:a16="http://schemas.microsoft.com/office/drawing/2014/main" id="{7D85BD07-8AEF-4E74-B7E1-47D075C3B511}"/>
               </a:ext>
             </a:extLst>
           </p:cNvPr>
-          <p:cNvSpPr txBox="1"/>
+          <p:cNvSpPr/>
           <p:nvPr/>
         </p:nvSpPr>
         <p:spPr>
           <a:xfrm>
-            <a:off x="975606" y="1507807"/>
-            <a:ext cx="10876882" cy="830997"/>
-          </a:xfrm>
-          <a:prstGeom prst="rect">
+            <a:off x="5631660" y="3484376"/>
+            <a:ext cx="157162" cy="147638"/>
+          </a:xfrm>
+          <a:prstGeom prst="ellipse">
             <a:avLst/>
           </a:prstGeom>
-          <a:noFill/>
-        </p:spPr>
-        <p:txBody>
-          <a:bodyPr wrap="square">
-            <a:spAutoFit/>
-          </a:bodyPr>
+          <a:solidFill>
+            <a:schemeClr val="accent6">
+              <a:lumMod val="75000"/>
+            </a:schemeClr>
+          </a:solidFill>
+          <a:ln>
+            <a:solidFill>
+              <a:schemeClr val="accent6">
+                <a:lumMod val="75000"/>
+              </a:schemeClr>
+            </a:solidFill>
+          </a:ln>
+        </p:spPr>
+        <p:style>
+          <a:lnRef idx="1">
+            <a:schemeClr val="accent1"/>
+          </a:lnRef>
+          <a:fillRef idx="3">
+            <a:schemeClr val="accent1"/>
+          </a:fillRef>
+          <a:effectRef idx="2">
+            <a:schemeClr val="accent1"/>
+          </a:effectRef>
+          <a:fontRef idx="minor">
+            <a:schemeClr val="lt1"/>
+          </a:fontRef>
+        </p:style>
+        <p:txBody>
+          <a:bodyPr rtlCol="0" anchor="ctr"/>
           <a:lstStyle/>
           <a:p>
-            <a:pPr marL="457200" indent="-457200">
-              <a:buFont typeface="+mj-lt"/>
-              <a:buAutoNum type="arabicPeriod"/>
-            </a:pPr>
-            <a:r>
-              <a:rPr lang="en-US" sz="2400" dirty="0"/>
-              <a:t>Select Device Manager</a:t>
-            </a:r>
-          </a:p>
-          <a:p>
-            <a:pPr marL="457200" indent="-457200">
-              <a:buFont typeface="+mj-lt"/>
-              <a:buAutoNum type="arabicPeriod"/>
-            </a:pPr>
-            <a:r>
-              <a:rPr lang="en-US" sz="2400" dirty="0"/>
-              <a:t>Click create Device</a:t>
+            <a:pPr algn="ctr"/>
+            <a:r>
+              <a:rPr lang="en-US" dirty="0">
+                <a:solidFill>
+                  <a:schemeClr val="bg1"/>
+                </a:solidFill>
+              </a:rPr>
+              <a:t>3</a:t>
+            </a:r>
+          </a:p>
+        </p:txBody>
+      </p:sp>
+      <p:sp>
+        <p:nvSpPr>
+          <p:cNvPr id="13" name="Ovale 12">
+            <a:extLst>
+              <a:ext uri="{FF2B5EF4-FFF2-40B4-BE49-F238E27FC236}">
+                <a16:creationId xmlns:a16="http://schemas.microsoft.com/office/drawing/2014/main" id="{B4C7B831-68DD-4B29-8328-00B4F1FD4108}"/>
+              </a:ext>
+            </a:extLst>
+          </p:cNvPr>
+          <p:cNvSpPr/>
+          <p:nvPr/>
+        </p:nvSpPr>
+        <p:spPr>
+          <a:xfrm>
+            <a:off x="5631660" y="3804404"/>
+            <a:ext cx="157162" cy="147638"/>
+          </a:xfrm>
+          <a:prstGeom prst="ellipse">
+            <a:avLst/>
+          </a:prstGeom>
+          <a:solidFill>
+            <a:schemeClr val="accent6">
+              <a:lumMod val="75000"/>
+            </a:schemeClr>
+          </a:solidFill>
+          <a:ln>
+            <a:solidFill>
+              <a:schemeClr val="accent6">
+                <a:lumMod val="75000"/>
+              </a:schemeClr>
+            </a:solidFill>
+          </a:ln>
+        </p:spPr>
+        <p:style>
+          <a:lnRef idx="1">
+            <a:schemeClr val="accent1"/>
+          </a:lnRef>
+          <a:fillRef idx="3">
+            <a:schemeClr val="accent1"/>
+          </a:fillRef>
+          <a:effectRef idx="2">
+            <a:schemeClr val="accent1"/>
+          </a:effectRef>
+          <a:fontRef idx="minor">
+            <a:schemeClr val="lt1"/>
+          </a:fontRef>
+        </p:style>
+        <p:txBody>
+          <a:bodyPr rtlCol="0" anchor="ctr"/>
+          <a:lstStyle/>
+          <a:p>
+            <a:pPr algn="ctr"/>
+            <a:r>
+              <a:rPr lang="en-US" dirty="0">
+                <a:solidFill>
+                  <a:schemeClr val="bg1"/>
+                </a:solidFill>
+              </a:rPr>
+              <a:t>4</a:t>
+            </a:r>
+          </a:p>
+        </p:txBody>
+      </p:sp>
+      <p:sp>
+        <p:nvSpPr>
+          <p:cNvPr id="14" name="Ovale 13">
+            <a:extLst>
+              <a:ext uri="{FF2B5EF4-FFF2-40B4-BE49-F238E27FC236}">
+                <a16:creationId xmlns:a16="http://schemas.microsoft.com/office/drawing/2014/main" id="{4A69F2AF-4F72-4E55-B088-79FFDC8E2D14}"/>
+              </a:ext>
+            </a:extLst>
+          </p:cNvPr>
+          <p:cNvSpPr/>
+          <p:nvPr/>
+        </p:nvSpPr>
+        <p:spPr>
+          <a:xfrm>
+            <a:off x="5631660" y="4121256"/>
+            <a:ext cx="157162" cy="147638"/>
+          </a:xfrm>
+          <a:prstGeom prst="ellipse">
+            <a:avLst/>
+          </a:prstGeom>
+          <a:solidFill>
+            <a:schemeClr val="accent6">
+              <a:lumMod val="75000"/>
+            </a:schemeClr>
+          </a:solidFill>
+          <a:ln>
+            <a:solidFill>
+              <a:schemeClr val="accent6">
+                <a:lumMod val="75000"/>
+              </a:schemeClr>
+            </a:solidFill>
+          </a:ln>
+        </p:spPr>
+        <p:style>
+          <a:lnRef idx="1">
+            <a:schemeClr val="accent1"/>
+          </a:lnRef>
+          <a:fillRef idx="3">
+            <a:schemeClr val="accent1"/>
+          </a:fillRef>
+          <a:effectRef idx="2">
+            <a:schemeClr val="accent1"/>
+          </a:effectRef>
+          <a:fontRef idx="minor">
+            <a:schemeClr val="lt1"/>
+          </a:fontRef>
+        </p:style>
+        <p:txBody>
+          <a:bodyPr rtlCol="0" anchor="ctr"/>
+          <a:lstStyle/>
+          <a:p>
+            <a:pPr algn="ctr"/>
+            <a:r>
+              <a:rPr lang="en-US" dirty="0">
+                <a:solidFill>
+                  <a:schemeClr val="bg1"/>
+                </a:solidFill>
+              </a:rPr>
+              <a:t>5</a:t>
             </a:r>
           </a:p>
         </p:txBody>
@@ -6064,7 +7845,7 @@
     </p:spTree>
     <p:extLst>
       <p:ext uri="{BB962C8B-B14F-4D97-AF65-F5344CB8AC3E}">
-        <p14:creationId xmlns:p14="http://schemas.microsoft.com/office/powerpoint/2010/main" val="3404653906"/>
+        <p14:creationId xmlns:p14="http://schemas.microsoft.com/office/powerpoint/2010/main" val="695680050"/>
       </p:ext>
     </p:extLst>
   </p:cSld>

</xml_diff>